<commit_message>
Added CV og TZ
</commit_message>
<xml_diff>
--- a/PB.pptx
+++ b/PB.pptx
@@ -9,10 +9,10 @@
     <p:sldId id="273" r:id="rId3"/>
     <p:sldId id="277" r:id="rId4"/>
     <p:sldId id="276" r:id="rId5"/>
-    <p:sldId id="275" r:id="rId6"/>
-    <p:sldId id="265" r:id="rId7"/>
-    <p:sldId id="266" r:id="rId8"/>
-    <p:sldId id="267" r:id="rId9"/>
+    <p:sldId id="278" r:id="rId6"/>
+    <p:sldId id="279" r:id="rId7"/>
+    <p:sldId id="280" r:id="rId8"/>
+    <p:sldId id="281" r:id="rId9"/>
   </p:sldIdLst>
   <p:sldSz cx="12192000" cy="6858000"/>
   <p:notesSz cx="6797675" cy="9926638"/>
@@ -250,7 +250,7 @@
           <a:p>
             <a:fld id="{30E13E06-E79C-44C2-8419-39D0BFD03B99}" type="datetimeFigureOut">
               <a:rPr lang="da-DK" smtClean="0"/>
-              <a:t>05-11-2021</a:t>
+              <a:t>14-11-2021</a:t>
             </a:fld>
             <a:endParaRPr lang="da-DK"/>
           </a:p>
@@ -420,7 +420,7 @@
           <a:p>
             <a:fld id="{30E13E06-E79C-44C2-8419-39D0BFD03B99}" type="datetimeFigureOut">
               <a:rPr lang="da-DK" smtClean="0"/>
-              <a:t>05-11-2021</a:t>
+              <a:t>14-11-2021</a:t>
             </a:fld>
             <a:endParaRPr lang="da-DK"/>
           </a:p>
@@ -600,7 +600,7 @@
           <a:p>
             <a:fld id="{30E13E06-E79C-44C2-8419-39D0BFD03B99}" type="datetimeFigureOut">
               <a:rPr lang="da-DK" smtClean="0"/>
-              <a:t>05-11-2021</a:t>
+              <a:t>14-11-2021</a:t>
             </a:fld>
             <a:endParaRPr lang="da-DK"/>
           </a:p>
@@ -770,7 +770,7 @@
           <a:p>
             <a:fld id="{30E13E06-E79C-44C2-8419-39D0BFD03B99}" type="datetimeFigureOut">
               <a:rPr lang="da-DK" smtClean="0"/>
-              <a:t>05-11-2021</a:t>
+              <a:t>14-11-2021</a:t>
             </a:fld>
             <a:endParaRPr lang="da-DK"/>
           </a:p>
@@ -1016,7 +1016,7 @@
           <a:p>
             <a:fld id="{30E13E06-E79C-44C2-8419-39D0BFD03B99}" type="datetimeFigureOut">
               <a:rPr lang="da-DK" smtClean="0"/>
-              <a:t>05-11-2021</a:t>
+              <a:t>14-11-2021</a:t>
             </a:fld>
             <a:endParaRPr lang="da-DK"/>
           </a:p>
@@ -1248,7 +1248,7 @@
           <a:p>
             <a:fld id="{30E13E06-E79C-44C2-8419-39D0BFD03B99}" type="datetimeFigureOut">
               <a:rPr lang="da-DK" smtClean="0"/>
-              <a:t>05-11-2021</a:t>
+              <a:t>14-11-2021</a:t>
             </a:fld>
             <a:endParaRPr lang="da-DK"/>
           </a:p>
@@ -1615,7 +1615,7 @@
           <a:p>
             <a:fld id="{30E13E06-E79C-44C2-8419-39D0BFD03B99}" type="datetimeFigureOut">
               <a:rPr lang="da-DK" smtClean="0"/>
-              <a:t>05-11-2021</a:t>
+              <a:t>14-11-2021</a:t>
             </a:fld>
             <a:endParaRPr lang="da-DK"/>
           </a:p>
@@ -1733,7 +1733,7 @@
           <a:p>
             <a:fld id="{30E13E06-E79C-44C2-8419-39D0BFD03B99}" type="datetimeFigureOut">
               <a:rPr lang="da-DK" smtClean="0"/>
-              <a:t>05-11-2021</a:t>
+              <a:t>14-11-2021</a:t>
             </a:fld>
             <a:endParaRPr lang="da-DK"/>
           </a:p>
@@ -1828,7 +1828,7 @@
           <a:p>
             <a:fld id="{30E13E06-E79C-44C2-8419-39D0BFD03B99}" type="datetimeFigureOut">
               <a:rPr lang="da-DK" smtClean="0"/>
-              <a:t>05-11-2021</a:t>
+              <a:t>14-11-2021</a:t>
             </a:fld>
             <a:endParaRPr lang="da-DK"/>
           </a:p>
@@ -2105,7 +2105,7 @@
           <a:p>
             <a:fld id="{30E13E06-E79C-44C2-8419-39D0BFD03B99}" type="datetimeFigureOut">
               <a:rPr lang="da-DK" smtClean="0"/>
-              <a:t>05-11-2021</a:t>
+              <a:t>14-11-2021</a:t>
             </a:fld>
             <a:endParaRPr lang="da-DK"/>
           </a:p>
@@ -2358,7 +2358,7 @@
           <a:p>
             <a:fld id="{30E13E06-E79C-44C2-8419-39D0BFD03B99}" type="datetimeFigureOut">
               <a:rPr lang="da-DK" smtClean="0"/>
-              <a:t>05-11-2021</a:t>
+              <a:t>14-11-2021</a:t>
             </a:fld>
             <a:endParaRPr lang="da-DK"/>
           </a:p>
@@ -2571,7 +2571,7 @@
           <a:p>
             <a:fld id="{30E13E06-E79C-44C2-8419-39D0BFD03B99}" type="datetimeFigureOut">
               <a:rPr lang="da-DK" smtClean="0"/>
-              <a:t>05-11-2021</a:t>
+              <a:t>14-11-2021</a:t>
             </a:fld>
             <a:endParaRPr lang="da-DK"/>
           </a:p>
@@ -9090,10 +9090,699 @@
           <a:chExt cx="0" cy="0"/>
         </a:xfrm>
       </p:grpSpPr>
+      <p:sp>
+        <p:nvSpPr>
+          <p:cNvPr id="25" name="Rectangle 24"/>
+          <p:cNvSpPr/>
+          <p:nvPr/>
+        </p:nvSpPr>
+        <p:spPr>
+          <a:xfrm rot="16200000">
+            <a:off x="11756751" y="579679"/>
+            <a:ext cx="527346" cy="338319"/>
+          </a:xfrm>
+          <a:prstGeom prst="rect">
+            <a:avLst/>
+          </a:prstGeom>
+          <a:noFill/>
+          <a:ln>
+            <a:solidFill>
+              <a:schemeClr val="tx1"/>
+            </a:solidFill>
+          </a:ln>
+        </p:spPr>
+        <p:style>
+          <a:lnRef idx="2">
+            <a:schemeClr val="accent1">
+              <a:shade val="50000"/>
+            </a:schemeClr>
+          </a:lnRef>
+          <a:fillRef idx="1">
+            <a:schemeClr val="accent1"/>
+          </a:fillRef>
+          <a:effectRef idx="0">
+            <a:schemeClr val="accent1"/>
+          </a:effectRef>
+          <a:fontRef idx="minor">
+            <a:schemeClr val="lt1"/>
+          </a:fontRef>
+        </p:style>
+        <p:txBody>
+          <a:bodyPr rtlCol="0" anchor="ctr"/>
+          <a:lstStyle/>
+          <a:p>
+            <a:r>
+              <a:rPr lang="da-DK" sz="2400" dirty="0">
+                <a:solidFill>
+                  <a:schemeClr val="tx1"/>
+                </a:solidFill>
+              </a:rPr>
+              <a:t>CV</a:t>
+            </a:r>
+          </a:p>
+        </p:txBody>
+      </p:sp>
+      <p:sp>
+        <p:nvSpPr>
+          <p:cNvPr id="46" name="Rectangle 45"/>
+          <p:cNvSpPr/>
+          <p:nvPr/>
+        </p:nvSpPr>
+        <p:spPr>
+          <a:xfrm>
+            <a:off x="6365634" y="0"/>
+            <a:ext cx="5488044" cy="6858000"/>
+          </a:xfrm>
+          <a:prstGeom prst="rect">
+            <a:avLst/>
+          </a:prstGeom>
+          <a:noFill/>
+          <a:ln>
+            <a:noFill/>
+          </a:ln>
+        </p:spPr>
+        <p:style>
+          <a:lnRef idx="2">
+            <a:schemeClr val="accent1">
+              <a:shade val="50000"/>
+            </a:schemeClr>
+          </a:lnRef>
+          <a:fillRef idx="1">
+            <a:schemeClr val="accent1"/>
+          </a:fillRef>
+          <a:effectRef idx="0">
+            <a:schemeClr val="accent1"/>
+          </a:effectRef>
+          <a:fontRef idx="minor">
+            <a:schemeClr val="lt1"/>
+          </a:fontRef>
+        </p:style>
+        <p:txBody>
+          <a:bodyPr rtlCol="0" anchor="t"/>
+          <a:lstStyle/>
+          <a:p>
+            <a:r>
+              <a:rPr lang="da-DK" sz="2000" u="sng" dirty="0" err="1">
+                <a:solidFill>
+                  <a:schemeClr val="tx1"/>
+                </a:solidFill>
+              </a:rPr>
+              <a:t>Cirqus</a:t>
+            </a:r>
+            <a:r>
+              <a:rPr lang="da-DK" sz="2000" u="sng" dirty="0">
+                <a:solidFill>
+                  <a:schemeClr val="tx1"/>
+                </a:solidFill>
+              </a:rPr>
+              <a:t> Voltaire</a:t>
+            </a:r>
+            <a:endParaRPr lang="en-US" sz="2000" u="sng" dirty="0">
+              <a:solidFill>
+                <a:schemeClr val="tx1"/>
+              </a:solidFill>
+            </a:endParaRPr>
+          </a:p>
+          <a:p>
+            <a:r>
+              <a:rPr lang="en-GB" sz="1600" dirty="0">
+                <a:solidFill>
+                  <a:schemeClr val="tx1"/>
+                </a:solidFill>
+              </a:rPr>
+              <a:t>Go for the sideways-facing skill shot target.</a:t>
+            </a:r>
+          </a:p>
+          <a:p>
+            <a:r>
+              <a:rPr lang="en-GB" sz="1600" dirty="0">
+                <a:solidFill>
+                  <a:schemeClr val="tx1"/>
+                </a:solidFill>
+              </a:rPr>
+              <a:t>Trap ball on right flipper when coming from ramp.</a:t>
+            </a:r>
+          </a:p>
+          <a:p>
+            <a:endParaRPr lang="en-US" sz="1600" dirty="0">
+              <a:solidFill>
+                <a:schemeClr val="tx1"/>
+              </a:solidFill>
+            </a:endParaRPr>
+          </a:p>
+          <a:p>
+            <a:r>
+              <a:rPr lang="en-GB" sz="1600" dirty="0">
+                <a:solidFill>
+                  <a:schemeClr val="tx1"/>
+                </a:solidFill>
+              </a:rPr>
+              <a:t>Spell W-O-W to raise up a Ringmaster, defeat the first ringmaster, he can be Backhanded!</a:t>
+            </a:r>
+          </a:p>
+          <a:p>
+            <a:endParaRPr lang="en-GB" sz="1600" dirty="0">
+              <a:solidFill>
+                <a:schemeClr val="tx1"/>
+              </a:solidFill>
+            </a:endParaRPr>
+          </a:p>
+          <a:p>
+            <a:r>
+              <a:rPr lang="en-GB" sz="1600" dirty="0">
+                <a:solidFill>
+                  <a:schemeClr val="tx1"/>
+                </a:solidFill>
+              </a:rPr>
+              <a:t>Stack MB, left ramp targets light lock can be stacked, and ramp locks is, used during Ringmaster #2, possible stacked with Juggler MB, shoot the left loop 3 times to light the Juggler, and three times to lock three balls and start juggler MB. </a:t>
+            </a:r>
+          </a:p>
+          <a:p>
+            <a:endParaRPr lang="en-GB" sz="1600" dirty="0">
+              <a:solidFill>
+                <a:schemeClr val="tx1"/>
+              </a:solidFill>
+            </a:endParaRPr>
+          </a:p>
+          <a:p>
+            <a:r>
+              <a:rPr lang="en-GB" sz="1600" dirty="0">
+                <a:solidFill>
+                  <a:schemeClr val="tx1"/>
+                </a:solidFill>
+              </a:rPr>
+              <a:t>Once you have completed Ringmaster Battle after defeating #5 you cannot defeat another Ringmaster until after you have played Join the </a:t>
+            </a:r>
+            <a:r>
+              <a:rPr lang="en-GB" sz="1600" dirty="0" err="1">
+                <a:solidFill>
+                  <a:schemeClr val="tx1"/>
+                </a:solidFill>
+              </a:rPr>
+              <a:t>Cirqus</a:t>
+            </a:r>
+            <a:r>
+              <a:rPr lang="en-US" sz="1600" dirty="0">
+                <a:solidFill>
+                  <a:schemeClr val="tx1"/>
+                </a:solidFill>
+              </a:rPr>
+              <a:t>. To Join also needs to</a:t>
+            </a:r>
+          </a:p>
+          <a:p>
+            <a:endParaRPr lang="en-US" sz="1600" dirty="0">
+              <a:solidFill>
+                <a:schemeClr val="tx1"/>
+              </a:solidFill>
+            </a:endParaRPr>
+          </a:p>
+          <a:p>
+            <a:r>
+              <a:rPr lang="en-GB" sz="1600" dirty="0">
+                <a:solidFill>
+                  <a:schemeClr val="tx1"/>
+                </a:solidFill>
+              </a:rPr>
+              <a:t>Acrobats - Shoot the right ramp 4 times.</a:t>
+            </a:r>
+          </a:p>
+          <a:p>
+            <a:r>
+              <a:rPr lang="en-GB" sz="1600" dirty="0">
+                <a:solidFill>
+                  <a:schemeClr val="tx1"/>
+                </a:solidFill>
+              </a:rPr>
+              <a:t>Spin - Shoot the inner loop surrounding the Ringmaster four times to spell S-P-I-N.</a:t>
+            </a:r>
+          </a:p>
+          <a:p>
+            <a:r>
+              <a:rPr lang="en-GB" sz="1600" dirty="0">
+                <a:solidFill>
+                  <a:schemeClr val="tx1"/>
+                </a:solidFill>
+              </a:rPr>
+              <a:t>Boom - Spell V-O-L-T by rolling over the red rollovers to charge up the Boom!</a:t>
+            </a:r>
+          </a:p>
+          <a:p>
+            <a:r>
+              <a:rPr lang="en-GB" sz="1600" dirty="0">
+                <a:solidFill>
+                  <a:schemeClr val="tx1"/>
+                </a:solidFill>
+              </a:rPr>
+              <a:t>Side show - Hitting the yellow Ringmaster </a:t>
+            </a:r>
+            <a:r>
+              <a:rPr lang="en-GB" sz="1600" dirty="0" err="1">
+                <a:solidFill>
+                  <a:schemeClr val="tx1"/>
+                </a:solidFill>
+              </a:rPr>
+              <a:t>standups</a:t>
+            </a:r>
+            <a:r>
+              <a:rPr lang="en-GB" sz="1600" dirty="0">
+                <a:solidFill>
+                  <a:schemeClr val="tx1"/>
+                </a:solidFill>
+              </a:rPr>
+              <a:t> enough times, the Side Show becomes lit just past the Juggler magnet.</a:t>
+            </a:r>
+          </a:p>
+          <a:p>
+            <a:r>
+              <a:rPr lang="en-GB" sz="1600" dirty="0">
+                <a:solidFill>
+                  <a:schemeClr val="tx1"/>
+                </a:solidFill>
+              </a:rPr>
+              <a:t>Menagerie - Left of the racquetball ball's cage is a pseudo-slingshot, hit it enough times, or the white </a:t>
+            </a:r>
+            <a:r>
+              <a:rPr lang="en-GB" sz="1600" dirty="0" err="1">
+                <a:solidFill>
+                  <a:schemeClr val="tx1"/>
+                </a:solidFill>
+              </a:rPr>
+              <a:t>standup</a:t>
+            </a:r>
+            <a:r>
+              <a:rPr lang="en-GB" sz="1600" dirty="0">
+                <a:solidFill>
+                  <a:schemeClr val="tx1"/>
+                </a:solidFill>
+              </a:rPr>
+              <a:t> just above the cage, to spot hits toward the menagerie.</a:t>
+            </a:r>
+            <a:endParaRPr lang="en-US" sz="1600" dirty="0">
+              <a:solidFill>
+                <a:schemeClr val="tx1"/>
+              </a:solidFill>
+            </a:endParaRPr>
+          </a:p>
+        </p:txBody>
+      </p:sp>
+      <p:cxnSp>
+        <p:nvCxnSpPr>
+          <p:cNvPr id="3" name="Lige forbindelse 2">
+            <a:extLst>
+              <a:ext uri="{FF2B5EF4-FFF2-40B4-BE49-F238E27FC236}">
+                <a16:creationId xmlns:a16="http://schemas.microsoft.com/office/drawing/2014/main" id="{EC4D2C1E-30AB-4E50-A40F-877A9D7DE9C3}"/>
+              </a:ext>
+            </a:extLst>
+          </p:cNvPr>
+          <p:cNvCxnSpPr>
+            <a:cxnSpLocks/>
+          </p:cNvCxnSpPr>
+          <p:nvPr/>
+        </p:nvCxnSpPr>
+        <p:spPr>
+          <a:xfrm>
+            <a:off x="6151894" y="0"/>
+            <a:ext cx="0" cy="6858000"/>
+          </a:xfrm>
+          <a:prstGeom prst="line">
+            <a:avLst/>
+          </a:prstGeom>
+          <a:noFill/>
+          <a:ln>
+            <a:solidFill>
+              <a:schemeClr val="tx1"/>
+            </a:solidFill>
+            <a:prstDash val="dash"/>
+          </a:ln>
+        </p:spPr>
+        <p:style>
+          <a:lnRef idx="2">
+            <a:schemeClr val="accent1">
+              <a:shade val="50000"/>
+            </a:schemeClr>
+          </a:lnRef>
+          <a:fillRef idx="1">
+            <a:schemeClr val="accent1"/>
+          </a:fillRef>
+          <a:effectRef idx="0">
+            <a:schemeClr val="accent1"/>
+          </a:effectRef>
+          <a:fontRef idx="minor">
+            <a:schemeClr val="lt1"/>
+          </a:fontRef>
+        </p:style>
+      </p:cxnSp>
+      <p:cxnSp>
+        <p:nvCxnSpPr>
+          <p:cNvPr id="34" name="Lige forbindelse 33">
+            <a:extLst>
+              <a:ext uri="{FF2B5EF4-FFF2-40B4-BE49-F238E27FC236}">
+                <a16:creationId xmlns:a16="http://schemas.microsoft.com/office/drawing/2014/main" id="{8D81A370-147D-4985-A3D9-B95DCDF1235B}"/>
+              </a:ext>
+            </a:extLst>
+          </p:cNvPr>
+          <p:cNvCxnSpPr>
+            <a:cxnSpLocks/>
+          </p:cNvCxnSpPr>
+          <p:nvPr/>
+        </p:nvCxnSpPr>
+        <p:spPr>
+          <a:xfrm>
+            <a:off x="11853681" y="-17585"/>
+            <a:ext cx="0" cy="6858000"/>
+          </a:xfrm>
+          <a:prstGeom prst="line">
+            <a:avLst/>
+          </a:prstGeom>
+          <a:noFill/>
+          <a:ln>
+            <a:solidFill>
+              <a:schemeClr val="tx1"/>
+            </a:solidFill>
+            <a:prstDash val="dash"/>
+          </a:ln>
+        </p:spPr>
+        <p:style>
+          <a:lnRef idx="2">
+            <a:schemeClr val="accent1">
+              <a:shade val="50000"/>
+            </a:schemeClr>
+          </a:lnRef>
+          <a:fillRef idx="1">
+            <a:schemeClr val="accent1"/>
+          </a:fillRef>
+          <a:effectRef idx="0">
+            <a:schemeClr val="accent1"/>
+          </a:effectRef>
+          <a:fontRef idx="minor">
+            <a:schemeClr val="lt1"/>
+          </a:fontRef>
+        </p:style>
+      </p:cxnSp>
+      <p:cxnSp>
+        <p:nvCxnSpPr>
+          <p:cNvPr id="36" name="Lige forbindelse 35">
+            <a:extLst>
+              <a:ext uri="{FF2B5EF4-FFF2-40B4-BE49-F238E27FC236}">
+                <a16:creationId xmlns:a16="http://schemas.microsoft.com/office/drawing/2014/main" id="{C389E322-3657-4847-ABCA-8467052ED383}"/>
+              </a:ext>
+            </a:extLst>
+          </p:cNvPr>
+          <p:cNvCxnSpPr>
+            <a:cxnSpLocks/>
+          </p:cNvCxnSpPr>
+          <p:nvPr/>
+        </p:nvCxnSpPr>
+        <p:spPr>
+          <a:xfrm>
+            <a:off x="49261" y="3905"/>
+            <a:ext cx="12142739" cy="0"/>
+          </a:xfrm>
+          <a:prstGeom prst="line">
+            <a:avLst/>
+          </a:prstGeom>
+          <a:noFill/>
+          <a:ln>
+            <a:solidFill>
+              <a:schemeClr val="tx1"/>
+            </a:solidFill>
+            <a:prstDash val="dash"/>
+          </a:ln>
+        </p:spPr>
+        <p:style>
+          <a:lnRef idx="2">
+            <a:schemeClr val="accent1">
+              <a:shade val="50000"/>
+            </a:schemeClr>
+          </a:lnRef>
+          <a:fillRef idx="1">
+            <a:schemeClr val="accent1"/>
+          </a:fillRef>
+          <a:effectRef idx="0">
+            <a:schemeClr val="accent1"/>
+          </a:effectRef>
+          <a:fontRef idx="minor">
+            <a:schemeClr val="lt1"/>
+          </a:fontRef>
+        </p:style>
+      </p:cxnSp>
+      <p:cxnSp>
+        <p:nvCxnSpPr>
+          <p:cNvPr id="38" name="Lige forbindelse 37">
+            <a:extLst>
+              <a:ext uri="{FF2B5EF4-FFF2-40B4-BE49-F238E27FC236}">
+                <a16:creationId xmlns:a16="http://schemas.microsoft.com/office/drawing/2014/main" id="{188BE1E8-393B-41EA-9211-7A8793F72BFB}"/>
+              </a:ext>
+            </a:extLst>
+          </p:cNvPr>
+          <p:cNvCxnSpPr>
+            <a:cxnSpLocks/>
+          </p:cNvCxnSpPr>
+          <p:nvPr/>
+        </p:nvCxnSpPr>
+        <p:spPr>
+          <a:xfrm>
+            <a:off x="49261" y="6856535"/>
+            <a:ext cx="12142739" cy="1465"/>
+          </a:xfrm>
+          <a:prstGeom prst="line">
+            <a:avLst/>
+          </a:prstGeom>
+          <a:noFill/>
+          <a:ln>
+            <a:solidFill>
+              <a:schemeClr val="tx1"/>
+            </a:solidFill>
+            <a:prstDash val="dash"/>
+          </a:ln>
+        </p:spPr>
+        <p:style>
+          <a:lnRef idx="2">
+            <a:schemeClr val="accent1">
+              <a:shade val="50000"/>
+            </a:schemeClr>
+          </a:lnRef>
+          <a:fillRef idx="1">
+            <a:schemeClr val="accent1"/>
+          </a:fillRef>
+          <a:effectRef idx="0">
+            <a:schemeClr val="accent1"/>
+          </a:effectRef>
+          <a:fontRef idx="minor">
+            <a:schemeClr val="lt1"/>
+          </a:fontRef>
+        </p:style>
+      </p:cxnSp>
+      <p:sp>
+        <p:nvSpPr>
+          <p:cNvPr id="12" name="Rectangle 24">
+            <a:extLst>
+              <a:ext uri="{FF2B5EF4-FFF2-40B4-BE49-F238E27FC236}">
+                <a16:creationId xmlns:a16="http://schemas.microsoft.com/office/drawing/2014/main" id="{84962E53-B07A-4346-854D-5EE2BD297B19}"/>
+              </a:ext>
+            </a:extLst>
+          </p:cNvPr>
+          <p:cNvSpPr/>
+          <p:nvPr/>
+        </p:nvSpPr>
+        <p:spPr>
+          <a:xfrm rot="16200000">
+            <a:off x="11779794" y="75377"/>
+            <a:ext cx="481259" cy="338319"/>
+          </a:xfrm>
+          <a:prstGeom prst="rect">
+            <a:avLst/>
+          </a:prstGeom>
+          <a:noFill/>
+          <a:ln>
+            <a:solidFill>
+              <a:schemeClr val="tx1"/>
+            </a:solidFill>
+          </a:ln>
+        </p:spPr>
+        <p:style>
+          <a:lnRef idx="2">
+            <a:schemeClr val="accent1">
+              <a:shade val="50000"/>
+            </a:schemeClr>
+          </a:lnRef>
+          <a:fillRef idx="1">
+            <a:schemeClr val="accent1"/>
+          </a:fillRef>
+          <a:effectRef idx="0">
+            <a:schemeClr val="accent1"/>
+          </a:effectRef>
+          <a:fontRef idx="minor">
+            <a:schemeClr val="lt1"/>
+          </a:fontRef>
+        </p:style>
+        <p:txBody>
+          <a:bodyPr rtlCol="0" anchor="ctr"/>
+          <a:lstStyle/>
+          <a:p>
+            <a:r>
+              <a:rPr lang="da-DK" sz="2400" dirty="0">
+                <a:solidFill>
+                  <a:schemeClr val="tx1"/>
+                </a:solidFill>
+              </a:rPr>
+              <a:t>TZ</a:t>
+            </a:r>
+          </a:p>
+        </p:txBody>
+      </p:sp>
+      <p:sp>
+        <p:nvSpPr>
+          <p:cNvPr id="15" name="Rectangle 45">
+            <a:extLst>
+              <a:ext uri="{FF2B5EF4-FFF2-40B4-BE49-F238E27FC236}">
+                <a16:creationId xmlns:a16="http://schemas.microsoft.com/office/drawing/2014/main" id="{F184A27A-2F0A-423B-80C7-C68B72E9086E}"/>
+              </a:ext>
+            </a:extLst>
+          </p:cNvPr>
+          <p:cNvSpPr/>
+          <p:nvPr/>
+        </p:nvSpPr>
+        <p:spPr>
+          <a:xfrm>
+            <a:off x="488462" y="-1465"/>
+            <a:ext cx="5512319" cy="6858000"/>
+          </a:xfrm>
+          <a:prstGeom prst="rect">
+            <a:avLst/>
+          </a:prstGeom>
+          <a:noFill/>
+          <a:ln>
+            <a:noFill/>
+          </a:ln>
+        </p:spPr>
+        <p:style>
+          <a:lnRef idx="2">
+            <a:schemeClr val="accent1">
+              <a:shade val="50000"/>
+            </a:schemeClr>
+          </a:lnRef>
+          <a:fillRef idx="1">
+            <a:schemeClr val="accent1"/>
+          </a:fillRef>
+          <a:effectRef idx="0">
+            <a:schemeClr val="accent1"/>
+          </a:effectRef>
+          <a:fontRef idx="minor">
+            <a:schemeClr val="lt1"/>
+          </a:fontRef>
+        </p:style>
+        <p:txBody>
+          <a:bodyPr rtlCol="0" anchor="t"/>
+          <a:lstStyle/>
+          <a:p>
+            <a:r>
+              <a:rPr lang="en-GB" sz="2000" u="sng" dirty="0">
+                <a:solidFill>
+                  <a:schemeClr val="tx1"/>
+                </a:solidFill>
+              </a:rPr>
+              <a:t>AC/DC</a:t>
+            </a:r>
+            <a:endParaRPr lang="en-US" sz="2000" u="sng" dirty="0">
+              <a:solidFill>
+                <a:schemeClr val="tx1"/>
+              </a:solidFill>
+            </a:endParaRPr>
+          </a:p>
+          <a:p>
+            <a:r>
+              <a:rPr lang="da-DK" sz="1600" dirty="0">
+                <a:solidFill>
+                  <a:schemeClr val="tx1"/>
+                </a:solidFill>
+              </a:rPr>
+              <a:t>Start </a:t>
+            </a:r>
+            <a:r>
+              <a:rPr lang="da-DK" sz="1600" dirty="0" err="1">
+                <a:solidFill>
+                  <a:schemeClr val="tx1"/>
+                </a:solidFill>
+              </a:rPr>
+              <a:t>song</a:t>
+            </a:r>
+            <a:r>
+              <a:rPr lang="da-DK" sz="1600" dirty="0">
+                <a:solidFill>
+                  <a:schemeClr val="tx1"/>
+                </a:solidFill>
+              </a:rPr>
+              <a:t> ”Hells Bells”</a:t>
+            </a:r>
+          </a:p>
+          <a:p>
+            <a:r>
+              <a:rPr lang="da-DK" sz="1600" dirty="0">
+                <a:solidFill>
+                  <a:schemeClr val="tx1"/>
+                </a:solidFill>
+              </a:rPr>
+              <a:t>- </a:t>
+            </a:r>
+            <a:r>
+              <a:rPr lang="da-DK" sz="1600" dirty="0" err="1">
+                <a:solidFill>
+                  <a:schemeClr val="tx1"/>
+                </a:solidFill>
+              </a:rPr>
+              <a:t>Opening</a:t>
+            </a:r>
+            <a:r>
+              <a:rPr lang="da-DK" sz="1600" dirty="0">
+                <a:solidFill>
+                  <a:schemeClr val="tx1"/>
+                </a:solidFill>
+              </a:rPr>
+              <a:t> task; hit the </a:t>
+            </a:r>
+            <a:r>
+              <a:rPr lang="da-DK" sz="1600" dirty="0" err="1">
+                <a:solidFill>
+                  <a:schemeClr val="tx1"/>
+                </a:solidFill>
+              </a:rPr>
+              <a:t>bell</a:t>
+            </a:r>
+            <a:r>
+              <a:rPr lang="da-DK" sz="1600" dirty="0">
+                <a:solidFill>
+                  <a:schemeClr val="tx1"/>
+                </a:solidFill>
+              </a:rPr>
+              <a:t>.</a:t>
+            </a:r>
+          </a:p>
+          <a:p>
+            <a:pPr marL="285750" indent="-285750">
+              <a:buFontTx/>
+              <a:buChar char="-"/>
+            </a:pPr>
+            <a:endParaRPr lang="da-DK" sz="1600" dirty="0">
+              <a:solidFill>
+                <a:schemeClr val="tx1"/>
+              </a:solidFill>
+            </a:endParaRPr>
+          </a:p>
+          <a:p>
+            <a:endParaRPr lang="da-DK" sz="1600" dirty="0">
+              <a:solidFill>
+                <a:schemeClr val="tx1"/>
+              </a:solidFill>
+            </a:endParaRPr>
+          </a:p>
+        </p:txBody>
+      </p:sp>
     </p:spTree>
     <p:extLst>
       <p:ext uri="{BB962C8B-B14F-4D97-AF65-F5344CB8AC3E}">
-        <p14:creationId xmlns:p14="http://schemas.microsoft.com/office/powerpoint/2010/main" val="638144191"/>
+        <p14:creationId xmlns:p14="http://schemas.microsoft.com/office/powerpoint/2010/main" val="2814936833"/>
       </p:ext>
     </p:extLst>
   </p:cSld>
@@ -9120,10 +9809,931 @@
           <a:chExt cx="0" cy="0"/>
         </a:xfrm>
       </p:grpSpPr>
+      <p:sp>
+        <p:nvSpPr>
+          <p:cNvPr id="46" name="Rectangle 45"/>
+          <p:cNvSpPr/>
+          <p:nvPr/>
+        </p:nvSpPr>
+        <p:spPr>
+          <a:xfrm>
+            <a:off x="6361847" y="0"/>
+            <a:ext cx="5493393" cy="6858000"/>
+          </a:xfrm>
+          <a:prstGeom prst="rect">
+            <a:avLst/>
+          </a:prstGeom>
+          <a:noFill/>
+          <a:ln>
+            <a:noFill/>
+          </a:ln>
+        </p:spPr>
+        <p:style>
+          <a:lnRef idx="2">
+            <a:schemeClr val="accent1">
+              <a:shade val="50000"/>
+            </a:schemeClr>
+          </a:lnRef>
+          <a:fillRef idx="1">
+            <a:schemeClr val="accent1"/>
+          </a:fillRef>
+          <a:effectRef idx="0">
+            <a:schemeClr val="accent1"/>
+          </a:effectRef>
+          <a:fontRef idx="minor">
+            <a:schemeClr val="lt1"/>
+          </a:fontRef>
+        </p:style>
+        <p:txBody>
+          <a:bodyPr rtlCol="0" anchor="t"/>
+          <a:lstStyle/>
+          <a:p>
+            <a:r>
+              <a:rPr lang="da-DK" sz="2000" u="sng" dirty="0">
+                <a:solidFill>
+                  <a:schemeClr val="tx1"/>
+                </a:solidFill>
+              </a:rPr>
+              <a:t>Iron </a:t>
+            </a:r>
+            <a:r>
+              <a:rPr lang="da-DK" sz="2000" u="sng" dirty="0" err="1">
+                <a:solidFill>
+                  <a:schemeClr val="tx1"/>
+                </a:solidFill>
+              </a:rPr>
+              <a:t>maiden</a:t>
+            </a:r>
+            <a:endParaRPr lang="en-US" sz="2000" u="sng" dirty="0">
+              <a:solidFill>
+                <a:schemeClr val="tx1"/>
+              </a:solidFill>
+            </a:endParaRPr>
+          </a:p>
+          <a:p>
+            <a:r>
+              <a:rPr lang="da-DK" sz="1600" dirty="0" err="1">
+                <a:solidFill>
+                  <a:schemeClr val="tx1"/>
+                </a:solidFill>
+              </a:rPr>
+              <a:t>Superskill</a:t>
+            </a:r>
+            <a:r>
+              <a:rPr lang="da-DK" sz="1600" dirty="0">
+                <a:solidFill>
+                  <a:schemeClr val="tx1"/>
+                </a:solidFill>
+              </a:rPr>
+              <a:t> is hold </a:t>
+            </a:r>
+            <a:r>
+              <a:rPr lang="da-DK" sz="1600" dirty="0" err="1">
+                <a:solidFill>
+                  <a:schemeClr val="tx1"/>
+                </a:solidFill>
+              </a:rPr>
+              <a:t>left</a:t>
+            </a:r>
+            <a:r>
+              <a:rPr lang="da-DK" sz="1600" dirty="0">
+                <a:solidFill>
+                  <a:schemeClr val="tx1"/>
+                </a:solidFill>
+              </a:rPr>
+              <a:t> flipper, </a:t>
+            </a:r>
+            <a:r>
+              <a:rPr lang="da-DK" sz="1600" dirty="0" err="1">
+                <a:solidFill>
+                  <a:schemeClr val="tx1"/>
+                </a:solidFill>
+              </a:rPr>
+              <a:t>full</a:t>
+            </a:r>
+            <a:r>
+              <a:rPr lang="da-DK" sz="1600" dirty="0">
+                <a:solidFill>
+                  <a:schemeClr val="tx1"/>
+                </a:solidFill>
+              </a:rPr>
+              <a:t> </a:t>
+            </a:r>
+            <a:r>
+              <a:rPr lang="da-DK" sz="1600" dirty="0" err="1">
+                <a:solidFill>
+                  <a:schemeClr val="tx1"/>
+                </a:solidFill>
+              </a:rPr>
+              <a:t>plunge</a:t>
+            </a:r>
+            <a:r>
+              <a:rPr lang="da-DK" sz="1600" dirty="0">
+                <a:solidFill>
+                  <a:schemeClr val="tx1"/>
+                </a:solidFill>
+              </a:rPr>
+              <a:t>, hit super jackpot with upper flipper.</a:t>
+            </a:r>
+          </a:p>
+          <a:p>
+            <a:endParaRPr lang="da-DK" sz="1600" dirty="0">
+              <a:solidFill>
+                <a:schemeClr val="tx1"/>
+              </a:solidFill>
+            </a:endParaRPr>
+          </a:p>
+          <a:p>
+            <a:endParaRPr lang="en-US" sz="1600" dirty="0">
+              <a:solidFill>
+                <a:schemeClr val="tx1"/>
+              </a:solidFill>
+            </a:endParaRPr>
+          </a:p>
+          <a:p>
+            <a:endParaRPr lang="da-DK" sz="1600" dirty="0">
+              <a:solidFill>
+                <a:schemeClr val="tx1"/>
+              </a:solidFill>
+            </a:endParaRPr>
+          </a:p>
+        </p:txBody>
+      </p:sp>
+      <p:cxnSp>
+        <p:nvCxnSpPr>
+          <p:cNvPr id="3" name="Lige forbindelse 2">
+            <a:extLst>
+              <a:ext uri="{FF2B5EF4-FFF2-40B4-BE49-F238E27FC236}">
+                <a16:creationId xmlns:a16="http://schemas.microsoft.com/office/drawing/2014/main" id="{EC4D2C1E-30AB-4E50-A40F-877A9D7DE9C3}"/>
+              </a:ext>
+            </a:extLst>
+          </p:cNvPr>
+          <p:cNvCxnSpPr>
+            <a:cxnSpLocks/>
+          </p:cNvCxnSpPr>
+          <p:nvPr/>
+        </p:nvCxnSpPr>
+        <p:spPr>
+          <a:xfrm>
+            <a:off x="6122190" y="0"/>
+            <a:ext cx="0" cy="6858000"/>
+          </a:xfrm>
+          <a:prstGeom prst="line">
+            <a:avLst/>
+          </a:prstGeom>
+          <a:noFill/>
+          <a:ln>
+            <a:solidFill>
+              <a:schemeClr val="tx1"/>
+            </a:solidFill>
+            <a:prstDash val="dash"/>
+          </a:ln>
+        </p:spPr>
+        <p:style>
+          <a:lnRef idx="2">
+            <a:schemeClr val="accent1">
+              <a:shade val="50000"/>
+            </a:schemeClr>
+          </a:lnRef>
+          <a:fillRef idx="1">
+            <a:schemeClr val="accent1"/>
+          </a:fillRef>
+          <a:effectRef idx="0">
+            <a:schemeClr val="accent1"/>
+          </a:effectRef>
+          <a:fontRef idx="minor">
+            <a:schemeClr val="lt1"/>
+          </a:fontRef>
+        </p:style>
+      </p:cxnSp>
+      <p:sp>
+        <p:nvSpPr>
+          <p:cNvPr id="22" name="Rectangle 45">
+            <a:extLst>
+              <a:ext uri="{FF2B5EF4-FFF2-40B4-BE49-F238E27FC236}">
+                <a16:creationId xmlns:a16="http://schemas.microsoft.com/office/drawing/2014/main" id="{35966423-ABBF-430C-AFF2-7B909C7ED229}"/>
+              </a:ext>
+            </a:extLst>
+          </p:cNvPr>
+          <p:cNvSpPr/>
+          <p:nvPr/>
+        </p:nvSpPr>
+        <p:spPr>
+          <a:xfrm>
+            <a:off x="389140" y="0"/>
+            <a:ext cx="5581938" cy="6858000"/>
+          </a:xfrm>
+          <a:prstGeom prst="rect">
+            <a:avLst/>
+          </a:prstGeom>
+          <a:noFill/>
+          <a:ln>
+            <a:noFill/>
+          </a:ln>
+        </p:spPr>
+        <p:style>
+          <a:lnRef idx="2">
+            <a:schemeClr val="accent1">
+              <a:shade val="50000"/>
+            </a:schemeClr>
+          </a:lnRef>
+          <a:fillRef idx="1">
+            <a:schemeClr val="accent1"/>
+          </a:fillRef>
+          <a:effectRef idx="0">
+            <a:schemeClr val="accent1"/>
+          </a:effectRef>
+          <a:fontRef idx="minor">
+            <a:schemeClr val="lt1"/>
+          </a:fontRef>
+        </p:style>
+        <p:txBody>
+          <a:bodyPr rtlCol="0" anchor="t"/>
+          <a:lstStyle/>
+          <a:p>
+            <a:endParaRPr lang="da-DK" sz="2000" dirty="0">
+              <a:solidFill>
+                <a:schemeClr val="tx1"/>
+              </a:solidFill>
+            </a:endParaRPr>
+          </a:p>
+        </p:txBody>
+      </p:sp>
+      <p:cxnSp>
+        <p:nvCxnSpPr>
+          <p:cNvPr id="34" name="Lige forbindelse 33">
+            <a:extLst>
+              <a:ext uri="{FF2B5EF4-FFF2-40B4-BE49-F238E27FC236}">
+                <a16:creationId xmlns:a16="http://schemas.microsoft.com/office/drawing/2014/main" id="{8D81A370-147D-4985-A3D9-B95DCDF1235B}"/>
+              </a:ext>
+            </a:extLst>
+          </p:cNvPr>
+          <p:cNvCxnSpPr>
+            <a:cxnSpLocks/>
+          </p:cNvCxnSpPr>
+          <p:nvPr/>
+        </p:nvCxnSpPr>
+        <p:spPr>
+          <a:xfrm>
+            <a:off x="11855241" y="-17585"/>
+            <a:ext cx="0" cy="6858000"/>
+          </a:xfrm>
+          <a:prstGeom prst="line">
+            <a:avLst/>
+          </a:prstGeom>
+          <a:noFill/>
+          <a:ln>
+            <a:solidFill>
+              <a:schemeClr val="tx1"/>
+            </a:solidFill>
+            <a:prstDash val="dash"/>
+          </a:ln>
+        </p:spPr>
+        <p:style>
+          <a:lnRef idx="2">
+            <a:schemeClr val="accent1">
+              <a:shade val="50000"/>
+            </a:schemeClr>
+          </a:lnRef>
+          <a:fillRef idx="1">
+            <a:schemeClr val="accent1"/>
+          </a:fillRef>
+          <a:effectRef idx="0">
+            <a:schemeClr val="accent1"/>
+          </a:effectRef>
+          <a:fontRef idx="minor">
+            <a:schemeClr val="lt1"/>
+          </a:fontRef>
+        </p:style>
+      </p:cxnSp>
+      <p:cxnSp>
+        <p:nvCxnSpPr>
+          <p:cNvPr id="36" name="Lige forbindelse 35">
+            <a:extLst>
+              <a:ext uri="{FF2B5EF4-FFF2-40B4-BE49-F238E27FC236}">
+                <a16:creationId xmlns:a16="http://schemas.microsoft.com/office/drawing/2014/main" id="{C389E322-3657-4847-ABCA-8467052ED383}"/>
+              </a:ext>
+            </a:extLst>
+          </p:cNvPr>
+          <p:cNvCxnSpPr>
+            <a:cxnSpLocks/>
+          </p:cNvCxnSpPr>
+          <p:nvPr/>
+        </p:nvCxnSpPr>
+        <p:spPr>
+          <a:xfrm>
+            <a:off x="62523" y="0"/>
+            <a:ext cx="11973581" cy="0"/>
+          </a:xfrm>
+          <a:prstGeom prst="line">
+            <a:avLst/>
+          </a:prstGeom>
+          <a:noFill/>
+          <a:ln>
+            <a:solidFill>
+              <a:schemeClr val="tx1"/>
+            </a:solidFill>
+            <a:prstDash val="dash"/>
+          </a:ln>
+        </p:spPr>
+        <p:style>
+          <a:lnRef idx="2">
+            <a:schemeClr val="accent1">
+              <a:shade val="50000"/>
+            </a:schemeClr>
+          </a:lnRef>
+          <a:fillRef idx="1">
+            <a:schemeClr val="accent1"/>
+          </a:fillRef>
+          <a:effectRef idx="0">
+            <a:schemeClr val="accent1"/>
+          </a:effectRef>
+          <a:fontRef idx="minor">
+            <a:schemeClr val="lt1"/>
+          </a:fontRef>
+        </p:style>
+      </p:cxnSp>
+      <p:cxnSp>
+        <p:nvCxnSpPr>
+          <p:cNvPr id="38" name="Lige forbindelse 37">
+            <a:extLst>
+              <a:ext uri="{FF2B5EF4-FFF2-40B4-BE49-F238E27FC236}">
+                <a16:creationId xmlns:a16="http://schemas.microsoft.com/office/drawing/2014/main" id="{188BE1E8-393B-41EA-9211-7A8793F72BFB}"/>
+              </a:ext>
+            </a:extLst>
+          </p:cNvPr>
+          <p:cNvCxnSpPr>
+            <a:cxnSpLocks/>
+          </p:cNvCxnSpPr>
+          <p:nvPr/>
+        </p:nvCxnSpPr>
+        <p:spPr>
+          <a:xfrm>
+            <a:off x="50821" y="6856535"/>
+            <a:ext cx="12142739" cy="1465"/>
+          </a:xfrm>
+          <a:prstGeom prst="line">
+            <a:avLst/>
+          </a:prstGeom>
+          <a:noFill/>
+          <a:ln>
+            <a:solidFill>
+              <a:schemeClr val="tx1"/>
+            </a:solidFill>
+            <a:prstDash val="dash"/>
+          </a:ln>
+        </p:spPr>
+        <p:style>
+          <a:lnRef idx="2">
+            <a:schemeClr val="accent1">
+              <a:shade val="50000"/>
+            </a:schemeClr>
+          </a:lnRef>
+          <a:fillRef idx="1">
+            <a:schemeClr val="accent1"/>
+          </a:fillRef>
+          <a:effectRef idx="0">
+            <a:schemeClr val="accent1"/>
+          </a:effectRef>
+          <a:fontRef idx="minor">
+            <a:schemeClr val="lt1"/>
+          </a:fontRef>
+        </p:style>
+      </p:cxnSp>
+      <p:sp>
+        <p:nvSpPr>
+          <p:cNvPr id="14" name="Rectangle 45">
+            <a:extLst>
+              <a:ext uri="{FF2B5EF4-FFF2-40B4-BE49-F238E27FC236}">
+                <a16:creationId xmlns:a16="http://schemas.microsoft.com/office/drawing/2014/main" id="{7A0187B6-5002-4A4A-A1AF-0008BF9B9AB2}"/>
+              </a:ext>
+            </a:extLst>
+          </p:cNvPr>
+          <p:cNvSpPr/>
+          <p:nvPr/>
+        </p:nvSpPr>
+        <p:spPr>
+          <a:xfrm>
+            <a:off x="453293" y="-1465"/>
+            <a:ext cx="5521692" cy="6858000"/>
+          </a:xfrm>
+          <a:prstGeom prst="rect">
+            <a:avLst/>
+          </a:prstGeom>
+          <a:noFill/>
+          <a:ln>
+            <a:noFill/>
+          </a:ln>
+        </p:spPr>
+        <p:style>
+          <a:lnRef idx="2">
+            <a:schemeClr val="accent1">
+              <a:shade val="50000"/>
+            </a:schemeClr>
+          </a:lnRef>
+          <a:fillRef idx="1">
+            <a:schemeClr val="accent1"/>
+          </a:fillRef>
+          <a:effectRef idx="0">
+            <a:schemeClr val="accent1"/>
+          </a:effectRef>
+          <a:fontRef idx="minor">
+            <a:schemeClr val="lt1"/>
+          </a:fontRef>
+        </p:style>
+        <p:txBody>
+          <a:bodyPr rtlCol="0" anchor="t"/>
+          <a:lstStyle/>
+          <a:p>
+            <a:r>
+              <a:rPr lang="da-DK" sz="2000" u="sng" dirty="0" err="1">
+                <a:solidFill>
+                  <a:schemeClr val="tx1"/>
+                </a:solidFill>
+              </a:rPr>
+              <a:t>Twillight</a:t>
+            </a:r>
+            <a:r>
+              <a:rPr lang="da-DK" sz="2000" u="sng" dirty="0">
+                <a:solidFill>
+                  <a:schemeClr val="tx1"/>
+                </a:solidFill>
+              </a:rPr>
+              <a:t> Zone</a:t>
+            </a:r>
+            <a:endParaRPr lang="en-US" sz="2000" u="sng" dirty="0">
+              <a:solidFill>
+                <a:schemeClr val="tx1"/>
+              </a:solidFill>
+            </a:endParaRPr>
+          </a:p>
+          <a:p>
+            <a:r>
+              <a:rPr lang="da-DK" sz="1600" dirty="0">
+                <a:solidFill>
+                  <a:schemeClr val="tx1"/>
+                </a:solidFill>
+              </a:rPr>
+              <a:t>Do not go for </a:t>
+            </a:r>
+            <a:r>
+              <a:rPr lang="da-DK" sz="1600" dirty="0" err="1">
+                <a:solidFill>
+                  <a:schemeClr val="tx1"/>
+                </a:solidFill>
+              </a:rPr>
+              <a:t>Skill</a:t>
+            </a:r>
+            <a:r>
+              <a:rPr lang="da-DK" sz="1600" dirty="0">
+                <a:solidFill>
+                  <a:schemeClr val="tx1"/>
+                </a:solidFill>
+              </a:rPr>
+              <a:t> </a:t>
+            </a:r>
+            <a:r>
+              <a:rPr lang="da-DK" sz="1600" dirty="0" err="1">
+                <a:solidFill>
+                  <a:schemeClr val="tx1"/>
+                </a:solidFill>
+              </a:rPr>
+              <a:t>shoots</a:t>
+            </a:r>
+            <a:r>
+              <a:rPr lang="da-DK" sz="1600" dirty="0">
+                <a:solidFill>
+                  <a:schemeClr val="tx1"/>
+                </a:solidFill>
+              </a:rPr>
+              <a:t>, </a:t>
+            </a:r>
+            <a:r>
+              <a:rPr lang="da-DK" sz="1600" dirty="0" err="1">
+                <a:solidFill>
+                  <a:schemeClr val="tx1"/>
+                </a:solidFill>
+              </a:rPr>
+              <a:t>bumber</a:t>
+            </a:r>
+            <a:r>
+              <a:rPr lang="da-DK" sz="1600" dirty="0">
+                <a:solidFill>
+                  <a:schemeClr val="tx1"/>
+                </a:solidFill>
+              </a:rPr>
+              <a:t> </a:t>
+            </a:r>
+            <a:r>
+              <a:rPr lang="da-DK" sz="1600" dirty="0" err="1">
+                <a:solidFill>
+                  <a:schemeClr val="tx1"/>
+                </a:solidFill>
+              </a:rPr>
+              <a:t>are</a:t>
+            </a:r>
+            <a:r>
+              <a:rPr lang="da-DK" sz="1600" dirty="0">
+                <a:solidFill>
+                  <a:schemeClr val="tx1"/>
+                </a:solidFill>
+              </a:rPr>
+              <a:t> to </a:t>
+            </a:r>
+            <a:r>
+              <a:rPr lang="da-DK" sz="1600" dirty="0" err="1">
+                <a:solidFill>
+                  <a:schemeClr val="tx1"/>
+                </a:solidFill>
+              </a:rPr>
+              <a:t>dangerously</a:t>
+            </a:r>
+            <a:r>
+              <a:rPr lang="da-DK" sz="1600" dirty="0">
+                <a:solidFill>
+                  <a:schemeClr val="tx1"/>
+                </a:solidFill>
+              </a:rPr>
+              <a:t>.</a:t>
+            </a:r>
+          </a:p>
+          <a:p>
+            <a:r>
+              <a:rPr lang="en-US" sz="1600" dirty="0">
+                <a:solidFill>
+                  <a:schemeClr val="tx1"/>
+                </a:solidFill>
+              </a:rPr>
+              <a:t>Never go to clock target, in any modes.</a:t>
+            </a:r>
+          </a:p>
+          <a:p>
+            <a:endParaRPr lang="da-DK" sz="1600" i="1" dirty="0">
+              <a:solidFill>
+                <a:schemeClr val="tx1"/>
+              </a:solidFill>
+            </a:endParaRPr>
+          </a:p>
+          <a:p>
+            <a:r>
+              <a:rPr lang="da-DK" sz="1600" dirty="0">
+                <a:solidFill>
+                  <a:schemeClr val="tx1"/>
+                </a:solidFill>
+              </a:rPr>
+              <a:t>Return from </a:t>
+            </a:r>
+            <a:r>
+              <a:rPr lang="da-DK" sz="1600" dirty="0" err="1">
+                <a:solidFill>
+                  <a:schemeClr val="tx1"/>
+                </a:solidFill>
+              </a:rPr>
+              <a:t>slotmachine</a:t>
+            </a:r>
+            <a:r>
+              <a:rPr lang="da-DK" sz="1600" dirty="0">
+                <a:solidFill>
+                  <a:schemeClr val="tx1"/>
+                </a:solidFill>
+              </a:rPr>
+              <a:t> </a:t>
+            </a:r>
+            <a:r>
+              <a:rPr lang="da-DK" sz="1600" dirty="0" err="1">
+                <a:solidFill>
+                  <a:schemeClr val="tx1"/>
+                </a:solidFill>
+              </a:rPr>
+              <a:t>probably</a:t>
+            </a:r>
+            <a:r>
+              <a:rPr lang="da-DK" sz="1600" dirty="0">
+                <a:solidFill>
+                  <a:schemeClr val="tx1"/>
+                </a:solidFill>
+              </a:rPr>
+              <a:t> </a:t>
+            </a:r>
+            <a:r>
+              <a:rPr lang="da-DK" sz="1600" dirty="0" err="1">
+                <a:solidFill>
+                  <a:schemeClr val="tx1"/>
+                </a:solidFill>
+              </a:rPr>
+              <a:t>bounce</a:t>
+            </a:r>
+            <a:r>
+              <a:rPr lang="da-DK" sz="1600" dirty="0">
+                <a:solidFill>
+                  <a:schemeClr val="tx1"/>
+                </a:solidFill>
+              </a:rPr>
+              <a:t>-over, find out.</a:t>
+            </a:r>
+          </a:p>
+          <a:p>
+            <a:endParaRPr lang="da-DK" sz="1600" dirty="0">
+              <a:solidFill>
+                <a:schemeClr val="tx1"/>
+              </a:solidFill>
+            </a:endParaRPr>
+          </a:p>
+          <a:p>
+            <a:r>
+              <a:rPr lang="en-US" sz="1600" dirty="0">
+                <a:solidFill>
+                  <a:schemeClr val="tx1"/>
+                </a:solidFill>
+              </a:rPr>
+              <a:t>Hit Left ramp, Right ramp to light lock and Gumball, lock one ball, if no Powerball installed, go for Gumball MB (has </a:t>
+            </a:r>
+            <a:r>
+              <a:rPr lang="en-US" sz="1600" dirty="0" err="1">
+                <a:solidFill>
+                  <a:schemeClr val="tx1"/>
+                </a:solidFill>
+              </a:rPr>
+              <a:t>ballsaver</a:t>
+            </a:r>
+            <a:r>
+              <a:rPr lang="en-US" sz="1600" dirty="0">
+                <a:solidFill>
+                  <a:schemeClr val="tx1"/>
+                </a:solidFill>
+              </a:rPr>
+              <a:t> as only one), camera cheat can be used for second Jackpot.</a:t>
+            </a:r>
+          </a:p>
+          <a:p>
+            <a:r>
+              <a:rPr lang="en-US" sz="1600" dirty="0">
+                <a:solidFill>
+                  <a:schemeClr val="tx1"/>
+                </a:solidFill>
+              </a:rPr>
+              <a:t>If in “The Spiral” mode, use </a:t>
+            </a:r>
+            <a:r>
+              <a:rPr lang="en-US" sz="1600" dirty="0" err="1">
+                <a:solidFill>
+                  <a:schemeClr val="tx1"/>
+                </a:solidFill>
+              </a:rPr>
+              <a:t>ballsaver</a:t>
+            </a:r>
+            <a:r>
+              <a:rPr lang="en-US" sz="1600" dirty="0">
+                <a:solidFill>
+                  <a:schemeClr val="tx1"/>
+                </a:solidFill>
+              </a:rPr>
+              <a:t> to get orbits.</a:t>
+            </a:r>
+          </a:p>
+          <a:p>
+            <a:r>
+              <a:rPr lang="en-US" sz="1600" dirty="0">
+                <a:solidFill>
+                  <a:schemeClr val="tx1"/>
+                </a:solidFill>
+              </a:rPr>
+              <a:t>If Powerball MB Jackpot are collected they are in Bonus, do not tilt, but camera can spot get bonus as rewards, get it, re-light jackpot on Left ramp.</a:t>
+            </a:r>
+          </a:p>
+          <a:p>
+            <a:endParaRPr lang="en-US" sz="1600" dirty="0">
+              <a:solidFill>
+                <a:schemeClr val="tx1"/>
+              </a:solidFill>
+            </a:endParaRPr>
+          </a:p>
+          <a:p>
+            <a:r>
+              <a:rPr lang="en-US" sz="1600" dirty="0">
+                <a:solidFill>
+                  <a:schemeClr val="tx1"/>
+                </a:solidFill>
+              </a:rPr>
+              <a:t>Otherwise go for MB by locking balls, Jackpot in Piano, grows, re-light in camera.</a:t>
+            </a:r>
+          </a:p>
+          <a:p>
+            <a:endParaRPr lang="en-US" sz="1600" dirty="0">
+              <a:solidFill>
+                <a:schemeClr val="tx1"/>
+              </a:solidFill>
+            </a:endParaRPr>
+          </a:p>
+          <a:p>
+            <a:r>
+              <a:rPr lang="en-US" sz="1600" dirty="0">
+                <a:solidFill>
+                  <a:schemeClr val="tx1"/>
+                </a:solidFill>
+              </a:rPr>
+              <a:t>Fast lock mode is not worth a lot of point, so just get control.</a:t>
+            </a:r>
+          </a:p>
+          <a:p>
+            <a:endParaRPr lang="en-US" sz="1600" dirty="0">
+              <a:solidFill>
+                <a:schemeClr val="tx1"/>
+              </a:solidFill>
+            </a:endParaRPr>
+          </a:p>
+          <a:p>
+            <a:r>
+              <a:rPr lang="en-US" sz="1600" dirty="0">
+                <a:solidFill>
+                  <a:schemeClr val="tx1"/>
+                </a:solidFill>
+              </a:rPr>
+              <a:t>If in LITZ </a:t>
+            </a:r>
+            <a:r>
+              <a:rPr lang="en-US" sz="1600" dirty="0" err="1">
+                <a:solidFill>
+                  <a:schemeClr val="tx1"/>
+                </a:solidFill>
+              </a:rPr>
+              <a:t>wirzard</a:t>
+            </a:r>
+            <a:r>
+              <a:rPr lang="en-US" sz="1600" dirty="0">
+                <a:solidFill>
+                  <a:schemeClr val="tx1"/>
+                </a:solidFill>
+              </a:rPr>
+              <a:t> mode go to </a:t>
+            </a:r>
+            <a:r>
+              <a:rPr lang="en-US" sz="1600" dirty="0" err="1">
+                <a:solidFill>
+                  <a:schemeClr val="tx1"/>
+                </a:solidFill>
+              </a:rPr>
+              <a:t>powerball</a:t>
+            </a:r>
+            <a:r>
+              <a:rPr lang="en-US" sz="1600" dirty="0">
+                <a:solidFill>
+                  <a:schemeClr val="tx1"/>
+                </a:solidFill>
+              </a:rPr>
+              <a:t> jackpots.</a:t>
+            </a:r>
+          </a:p>
+          <a:p>
+            <a:endParaRPr lang="en-US" sz="1600" dirty="0">
+              <a:solidFill>
+                <a:schemeClr val="tx1"/>
+              </a:solidFill>
+            </a:endParaRPr>
+          </a:p>
+          <a:p>
+            <a:endParaRPr lang="en-US" sz="1600" dirty="0">
+              <a:solidFill>
+                <a:schemeClr val="tx1"/>
+              </a:solidFill>
+            </a:endParaRPr>
+          </a:p>
+          <a:p>
+            <a:endParaRPr lang="en-US" sz="1600" dirty="0">
+              <a:solidFill>
+                <a:schemeClr val="tx1"/>
+              </a:solidFill>
+            </a:endParaRPr>
+          </a:p>
+          <a:p>
+            <a:endParaRPr lang="en-US" sz="1600" dirty="0">
+              <a:solidFill>
+                <a:schemeClr val="tx1"/>
+              </a:solidFill>
+            </a:endParaRPr>
+          </a:p>
+        </p:txBody>
+      </p:sp>
+      <p:sp>
+        <p:nvSpPr>
+          <p:cNvPr id="17" name="Rectangle 24">
+            <a:extLst>
+              <a:ext uri="{FF2B5EF4-FFF2-40B4-BE49-F238E27FC236}">
+                <a16:creationId xmlns:a16="http://schemas.microsoft.com/office/drawing/2014/main" id="{EB7F5936-FE9C-43D1-B172-6CCD8745CF89}"/>
+              </a:ext>
+            </a:extLst>
+          </p:cNvPr>
+          <p:cNvSpPr/>
+          <p:nvPr/>
+        </p:nvSpPr>
+        <p:spPr>
+          <a:xfrm rot="16200000">
+            <a:off x="11553878" y="2798606"/>
+            <a:ext cx="933371" cy="342873"/>
+          </a:xfrm>
+          <a:prstGeom prst="rect">
+            <a:avLst/>
+          </a:prstGeom>
+          <a:noFill/>
+          <a:ln>
+            <a:solidFill>
+              <a:schemeClr val="tx1"/>
+            </a:solidFill>
+          </a:ln>
+        </p:spPr>
+        <p:style>
+          <a:lnRef idx="2">
+            <a:schemeClr val="accent1">
+              <a:shade val="50000"/>
+            </a:schemeClr>
+          </a:lnRef>
+          <a:fillRef idx="1">
+            <a:schemeClr val="accent1"/>
+          </a:fillRef>
+          <a:effectRef idx="0">
+            <a:schemeClr val="accent1"/>
+          </a:effectRef>
+          <a:fontRef idx="minor">
+            <a:schemeClr val="lt1"/>
+          </a:fontRef>
+        </p:style>
+        <p:txBody>
+          <a:bodyPr rtlCol="0" anchor="ctr"/>
+          <a:lstStyle/>
+          <a:p>
+            <a:r>
+              <a:rPr lang="da-DK" sz="2400" dirty="0">
+                <a:solidFill>
+                  <a:schemeClr val="tx1"/>
+                </a:solidFill>
+              </a:rPr>
+              <a:t>IMDN</a:t>
+            </a:r>
+          </a:p>
+        </p:txBody>
+      </p:sp>
+      <p:sp>
+        <p:nvSpPr>
+          <p:cNvPr id="18" name="Rectangle 24">
+            <a:extLst>
+              <a:ext uri="{FF2B5EF4-FFF2-40B4-BE49-F238E27FC236}">
+                <a16:creationId xmlns:a16="http://schemas.microsoft.com/office/drawing/2014/main" id="{D325B5EF-A0C6-45BB-8935-DF1224969D88}"/>
+              </a:ext>
+            </a:extLst>
+          </p:cNvPr>
+          <p:cNvSpPr/>
+          <p:nvPr/>
+        </p:nvSpPr>
+        <p:spPr>
+          <a:xfrm rot="16200000">
+            <a:off x="11563202" y="1872523"/>
+            <a:ext cx="922398" cy="338319"/>
+          </a:xfrm>
+          <a:prstGeom prst="rect">
+            <a:avLst/>
+          </a:prstGeom>
+          <a:noFill/>
+          <a:ln>
+            <a:solidFill>
+              <a:schemeClr val="tx1"/>
+            </a:solidFill>
+          </a:ln>
+        </p:spPr>
+        <p:style>
+          <a:lnRef idx="2">
+            <a:schemeClr val="accent1">
+              <a:shade val="50000"/>
+            </a:schemeClr>
+          </a:lnRef>
+          <a:fillRef idx="1">
+            <a:schemeClr val="accent1"/>
+          </a:fillRef>
+          <a:effectRef idx="0">
+            <a:schemeClr val="accent1"/>
+          </a:effectRef>
+          <a:fontRef idx="minor">
+            <a:schemeClr val="lt1"/>
+          </a:fontRef>
+        </p:style>
+        <p:txBody>
+          <a:bodyPr rtlCol="0" anchor="ctr"/>
+          <a:lstStyle/>
+          <a:p>
+            <a:r>
+              <a:rPr lang="da-DK" sz="2400" dirty="0">
+                <a:solidFill>
+                  <a:schemeClr val="tx1"/>
+                </a:solidFill>
+              </a:rPr>
+              <a:t>ACDC</a:t>
+            </a:r>
+          </a:p>
+        </p:txBody>
+      </p:sp>
     </p:spTree>
     <p:extLst>
       <p:ext uri="{BB962C8B-B14F-4D97-AF65-F5344CB8AC3E}">
-        <p14:creationId xmlns:p14="http://schemas.microsoft.com/office/powerpoint/2010/main" val="2981667724"/>
+        <p14:creationId xmlns:p14="http://schemas.microsoft.com/office/powerpoint/2010/main" val="3648665761"/>
       </p:ext>
     </p:extLst>
   </p:cSld>
@@ -9150,10 +10760,709 @@
           <a:chExt cx="0" cy="0"/>
         </a:xfrm>
       </p:grpSpPr>
+      <p:sp>
+        <p:nvSpPr>
+          <p:cNvPr id="46" name="Rectangle 45"/>
+          <p:cNvSpPr/>
+          <p:nvPr/>
+        </p:nvSpPr>
+        <p:spPr>
+          <a:xfrm>
+            <a:off x="6361847" y="0"/>
+            <a:ext cx="5493393" cy="6858000"/>
+          </a:xfrm>
+          <a:prstGeom prst="rect">
+            <a:avLst/>
+          </a:prstGeom>
+          <a:noFill/>
+          <a:ln>
+            <a:noFill/>
+          </a:ln>
+        </p:spPr>
+        <p:style>
+          <a:lnRef idx="2">
+            <a:schemeClr val="accent1">
+              <a:shade val="50000"/>
+            </a:schemeClr>
+          </a:lnRef>
+          <a:fillRef idx="1">
+            <a:schemeClr val="accent1"/>
+          </a:fillRef>
+          <a:effectRef idx="0">
+            <a:schemeClr val="accent1"/>
+          </a:effectRef>
+          <a:fontRef idx="minor">
+            <a:schemeClr val="lt1"/>
+          </a:fontRef>
+        </p:style>
+        <p:txBody>
+          <a:bodyPr rtlCol="0" anchor="t"/>
+          <a:lstStyle/>
+          <a:p>
+            <a:r>
+              <a:rPr lang="da-DK" sz="2000" u="sng" dirty="0">
+                <a:solidFill>
+                  <a:schemeClr val="tx1"/>
+                </a:solidFill>
+              </a:rPr>
+              <a:t>Ghost Busters</a:t>
+            </a:r>
+            <a:endParaRPr lang="en-US" sz="2000" u="sng" dirty="0">
+              <a:solidFill>
+                <a:schemeClr val="tx1"/>
+              </a:solidFill>
+            </a:endParaRPr>
+          </a:p>
+          <a:p>
+            <a:r>
+              <a:rPr lang="da-DK" sz="1600" dirty="0" err="1">
+                <a:solidFill>
+                  <a:schemeClr val="tx1"/>
+                </a:solidFill>
+              </a:rPr>
+              <a:t>Skillshot</a:t>
+            </a:r>
+            <a:r>
+              <a:rPr lang="da-DK" sz="1600" dirty="0">
+                <a:solidFill>
+                  <a:schemeClr val="tx1"/>
+                </a:solidFill>
+              </a:rPr>
+              <a:t>, </a:t>
+            </a:r>
+            <a:r>
+              <a:rPr lang="da-DK" sz="1600" dirty="0" err="1">
+                <a:solidFill>
+                  <a:schemeClr val="tx1"/>
+                </a:solidFill>
+              </a:rPr>
+              <a:t>forget</a:t>
+            </a:r>
+            <a:r>
+              <a:rPr lang="da-DK" sz="1600" dirty="0">
+                <a:solidFill>
+                  <a:schemeClr val="tx1"/>
+                </a:solidFill>
+              </a:rPr>
+              <a:t> P-K-E rollovers;</a:t>
+            </a:r>
+          </a:p>
+          <a:p>
+            <a:r>
+              <a:rPr lang="da-DK" sz="1600" dirty="0" err="1">
+                <a:solidFill>
+                  <a:schemeClr val="tx1"/>
+                </a:solidFill>
+              </a:rPr>
+              <a:t>Fullplunge</a:t>
+            </a:r>
+            <a:r>
+              <a:rPr lang="da-DK" sz="1600" dirty="0">
+                <a:solidFill>
+                  <a:schemeClr val="tx1"/>
+                </a:solidFill>
+              </a:rPr>
+              <a:t>, </a:t>
+            </a:r>
+            <a:r>
+              <a:rPr lang="da-DK" sz="1600" dirty="0" err="1">
+                <a:solidFill>
+                  <a:schemeClr val="tx1"/>
+                </a:solidFill>
+              </a:rPr>
+              <a:t>catch</a:t>
+            </a:r>
+            <a:r>
+              <a:rPr lang="da-DK" sz="1600" dirty="0">
+                <a:solidFill>
+                  <a:schemeClr val="tx1"/>
+                </a:solidFill>
+              </a:rPr>
+              <a:t>, hit Right loop, default, to start ”Okay </a:t>
+            </a:r>
+            <a:r>
+              <a:rPr lang="da-DK" sz="1600" dirty="0" err="1">
+                <a:solidFill>
+                  <a:schemeClr val="tx1"/>
+                </a:solidFill>
+              </a:rPr>
+              <a:t>Who</a:t>
+            </a:r>
+            <a:r>
+              <a:rPr lang="da-DK" sz="1600" dirty="0">
+                <a:solidFill>
+                  <a:schemeClr val="tx1"/>
+                </a:solidFill>
+              </a:rPr>
+              <a:t> </a:t>
+            </a:r>
+            <a:r>
+              <a:rPr lang="da-DK" sz="1600" dirty="0" err="1">
+                <a:solidFill>
+                  <a:schemeClr val="tx1"/>
+                </a:solidFill>
+              </a:rPr>
+              <a:t>Brought</a:t>
+            </a:r>
+            <a:r>
+              <a:rPr lang="da-DK" sz="1600" dirty="0">
+                <a:solidFill>
+                  <a:schemeClr val="tx1"/>
+                </a:solidFill>
+              </a:rPr>
+              <a:t> The Dog</a:t>
+            </a:r>
+            <a:r>
+              <a:rPr lang="en-US" sz="1600" dirty="0">
+                <a:solidFill>
+                  <a:schemeClr val="tx1"/>
+                </a:solidFill>
+              </a:rPr>
+              <a:t>?”</a:t>
+            </a:r>
+          </a:p>
+          <a:p>
+            <a:endParaRPr lang="en-US" sz="1600" dirty="0">
+              <a:solidFill>
+                <a:schemeClr val="tx1"/>
+              </a:solidFill>
+            </a:endParaRPr>
+          </a:p>
+          <a:p>
+            <a:endParaRPr lang="da-DK" sz="1600" dirty="0">
+              <a:solidFill>
+                <a:schemeClr val="tx1"/>
+              </a:solidFill>
+            </a:endParaRPr>
+          </a:p>
+          <a:p>
+            <a:endParaRPr lang="en-US" sz="1600" dirty="0">
+              <a:solidFill>
+                <a:schemeClr val="tx1"/>
+              </a:solidFill>
+            </a:endParaRPr>
+          </a:p>
+          <a:p>
+            <a:endParaRPr lang="da-DK" sz="1600" dirty="0">
+              <a:solidFill>
+                <a:schemeClr val="tx1"/>
+              </a:solidFill>
+            </a:endParaRPr>
+          </a:p>
+        </p:txBody>
+      </p:sp>
+      <p:cxnSp>
+        <p:nvCxnSpPr>
+          <p:cNvPr id="3" name="Lige forbindelse 2">
+            <a:extLst>
+              <a:ext uri="{FF2B5EF4-FFF2-40B4-BE49-F238E27FC236}">
+                <a16:creationId xmlns:a16="http://schemas.microsoft.com/office/drawing/2014/main" id="{EC4D2C1E-30AB-4E50-A40F-877A9D7DE9C3}"/>
+              </a:ext>
+            </a:extLst>
+          </p:cNvPr>
+          <p:cNvCxnSpPr>
+            <a:cxnSpLocks/>
+          </p:cNvCxnSpPr>
+          <p:nvPr/>
+        </p:nvCxnSpPr>
+        <p:spPr>
+          <a:xfrm>
+            <a:off x="6122190" y="0"/>
+            <a:ext cx="0" cy="6858000"/>
+          </a:xfrm>
+          <a:prstGeom prst="line">
+            <a:avLst/>
+          </a:prstGeom>
+          <a:noFill/>
+          <a:ln>
+            <a:solidFill>
+              <a:schemeClr val="tx1"/>
+            </a:solidFill>
+            <a:prstDash val="dash"/>
+          </a:ln>
+        </p:spPr>
+        <p:style>
+          <a:lnRef idx="2">
+            <a:schemeClr val="accent1">
+              <a:shade val="50000"/>
+            </a:schemeClr>
+          </a:lnRef>
+          <a:fillRef idx="1">
+            <a:schemeClr val="accent1"/>
+          </a:fillRef>
+          <a:effectRef idx="0">
+            <a:schemeClr val="accent1"/>
+          </a:effectRef>
+          <a:fontRef idx="minor">
+            <a:schemeClr val="lt1"/>
+          </a:fontRef>
+        </p:style>
+      </p:cxnSp>
+      <p:sp>
+        <p:nvSpPr>
+          <p:cNvPr id="22" name="Rectangle 45">
+            <a:extLst>
+              <a:ext uri="{FF2B5EF4-FFF2-40B4-BE49-F238E27FC236}">
+                <a16:creationId xmlns:a16="http://schemas.microsoft.com/office/drawing/2014/main" id="{35966423-ABBF-430C-AFF2-7B909C7ED229}"/>
+              </a:ext>
+            </a:extLst>
+          </p:cNvPr>
+          <p:cNvSpPr/>
+          <p:nvPr/>
+        </p:nvSpPr>
+        <p:spPr>
+          <a:xfrm>
+            <a:off x="389140" y="0"/>
+            <a:ext cx="5581938" cy="6858000"/>
+          </a:xfrm>
+          <a:prstGeom prst="rect">
+            <a:avLst/>
+          </a:prstGeom>
+          <a:noFill/>
+          <a:ln>
+            <a:noFill/>
+          </a:ln>
+        </p:spPr>
+        <p:style>
+          <a:lnRef idx="2">
+            <a:schemeClr val="accent1">
+              <a:shade val="50000"/>
+            </a:schemeClr>
+          </a:lnRef>
+          <a:fillRef idx="1">
+            <a:schemeClr val="accent1"/>
+          </a:fillRef>
+          <a:effectRef idx="0">
+            <a:schemeClr val="accent1"/>
+          </a:effectRef>
+          <a:fontRef idx="minor">
+            <a:schemeClr val="lt1"/>
+          </a:fontRef>
+        </p:style>
+        <p:txBody>
+          <a:bodyPr rtlCol="0" anchor="t"/>
+          <a:lstStyle/>
+          <a:p>
+            <a:endParaRPr lang="da-DK" sz="2000" dirty="0">
+              <a:solidFill>
+                <a:schemeClr val="tx1"/>
+              </a:solidFill>
+            </a:endParaRPr>
+          </a:p>
+        </p:txBody>
+      </p:sp>
+      <p:cxnSp>
+        <p:nvCxnSpPr>
+          <p:cNvPr id="34" name="Lige forbindelse 33">
+            <a:extLst>
+              <a:ext uri="{FF2B5EF4-FFF2-40B4-BE49-F238E27FC236}">
+                <a16:creationId xmlns:a16="http://schemas.microsoft.com/office/drawing/2014/main" id="{8D81A370-147D-4985-A3D9-B95DCDF1235B}"/>
+              </a:ext>
+            </a:extLst>
+          </p:cNvPr>
+          <p:cNvCxnSpPr>
+            <a:cxnSpLocks/>
+          </p:cNvCxnSpPr>
+          <p:nvPr/>
+        </p:nvCxnSpPr>
+        <p:spPr>
+          <a:xfrm>
+            <a:off x="11855241" y="-17585"/>
+            <a:ext cx="0" cy="6858000"/>
+          </a:xfrm>
+          <a:prstGeom prst="line">
+            <a:avLst/>
+          </a:prstGeom>
+          <a:noFill/>
+          <a:ln>
+            <a:solidFill>
+              <a:schemeClr val="tx1"/>
+            </a:solidFill>
+            <a:prstDash val="dash"/>
+          </a:ln>
+        </p:spPr>
+        <p:style>
+          <a:lnRef idx="2">
+            <a:schemeClr val="accent1">
+              <a:shade val="50000"/>
+            </a:schemeClr>
+          </a:lnRef>
+          <a:fillRef idx="1">
+            <a:schemeClr val="accent1"/>
+          </a:fillRef>
+          <a:effectRef idx="0">
+            <a:schemeClr val="accent1"/>
+          </a:effectRef>
+          <a:fontRef idx="minor">
+            <a:schemeClr val="lt1"/>
+          </a:fontRef>
+        </p:style>
+      </p:cxnSp>
+      <p:cxnSp>
+        <p:nvCxnSpPr>
+          <p:cNvPr id="36" name="Lige forbindelse 35">
+            <a:extLst>
+              <a:ext uri="{FF2B5EF4-FFF2-40B4-BE49-F238E27FC236}">
+                <a16:creationId xmlns:a16="http://schemas.microsoft.com/office/drawing/2014/main" id="{C389E322-3657-4847-ABCA-8467052ED383}"/>
+              </a:ext>
+            </a:extLst>
+          </p:cNvPr>
+          <p:cNvCxnSpPr>
+            <a:cxnSpLocks/>
+          </p:cNvCxnSpPr>
+          <p:nvPr/>
+        </p:nvCxnSpPr>
+        <p:spPr>
+          <a:xfrm>
+            <a:off x="62523" y="0"/>
+            <a:ext cx="11973581" cy="0"/>
+          </a:xfrm>
+          <a:prstGeom prst="line">
+            <a:avLst/>
+          </a:prstGeom>
+          <a:noFill/>
+          <a:ln>
+            <a:solidFill>
+              <a:schemeClr val="tx1"/>
+            </a:solidFill>
+            <a:prstDash val="dash"/>
+          </a:ln>
+        </p:spPr>
+        <p:style>
+          <a:lnRef idx="2">
+            <a:schemeClr val="accent1">
+              <a:shade val="50000"/>
+            </a:schemeClr>
+          </a:lnRef>
+          <a:fillRef idx="1">
+            <a:schemeClr val="accent1"/>
+          </a:fillRef>
+          <a:effectRef idx="0">
+            <a:schemeClr val="accent1"/>
+          </a:effectRef>
+          <a:fontRef idx="minor">
+            <a:schemeClr val="lt1"/>
+          </a:fontRef>
+        </p:style>
+      </p:cxnSp>
+      <p:cxnSp>
+        <p:nvCxnSpPr>
+          <p:cNvPr id="38" name="Lige forbindelse 37">
+            <a:extLst>
+              <a:ext uri="{FF2B5EF4-FFF2-40B4-BE49-F238E27FC236}">
+                <a16:creationId xmlns:a16="http://schemas.microsoft.com/office/drawing/2014/main" id="{188BE1E8-393B-41EA-9211-7A8793F72BFB}"/>
+              </a:ext>
+            </a:extLst>
+          </p:cNvPr>
+          <p:cNvCxnSpPr>
+            <a:cxnSpLocks/>
+          </p:cNvCxnSpPr>
+          <p:nvPr/>
+        </p:nvCxnSpPr>
+        <p:spPr>
+          <a:xfrm>
+            <a:off x="50821" y="6856535"/>
+            <a:ext cx="12142739" cy="1465"/>
+          </a:xfrm>
+          <a:prstGeom prst="line">
+            <a:avLst/>
+          </a:prstGeom>
+          <a:noFill/>
+          <a:ln>
+            <a:solidFill>
+              <a:schemeClr val="tx1"/>
+            </a:solidFill>
+            <a:prstDash val="dash"/>
+          </a:ln>
+        </p:spPr>
+        <p:style>
+          <a:lnRef idx="2">
+            <a:schemeClr val="accent1">
+              <a:shade val="50000"/>
+            </a:schemeClr>
+          </a:lnRef>
+          <a:fillRef idx="1">
+            <a:schemeClr val="accent1"/>
+          </a:fillRef>
+          <a:effectRef idx="0">
+            <a:schemeClr val="accent1"/>
+          </a:effectRef>
+          <a:fontRef idx="minor">
+            <a:schemeClr val="lt1"/>
+          </a:fontRef>
+        </p:style>
+      </p:cxnSp>
+      <p:sp>
+        <p:nvSpPr>
+          <p:cNvPr id="14" name="Rectangle 45">
+            <a:extLst>
+              <a:ext uri="{FF2B5EF4-FFF2-40B4-BE49-F238E27FC236}">
+                <a16:creationId xmlns:a16="http://schemas.microsoft.com/office/drawing/2014/main" id="{7A0187B6-5002-4A4A-A1AF-0008BF9B9AB2}"/>
+              </a:ext>
+            </a:extLst>
+          </p:cNvPr>
+          <p:cNvSpPr/>
+          <p:nvPr/>
+        </p:nvSpPr>
+        <p:spPr>
+          <a:xfrm>
+            <a:off x="453293" y="-1465"/>
+            <a:ext cx="5521692" cy="6858000"/>
+          </a:xfrm>
+          <a:prstGeom prst="rect">
+            <a:avLst/>
+          </a:prstGeom>
+          <a:noFill/>
+          <a:ln>
+            <a:noFill/>
+          </a:ln>
+        </p:spPr>
+        <p:style>
+          <a:lnRef idx="2">
+            <a:schemeClr val="accent1">
+              <a:shade val="50000"/>
+            </a:schemeClr>
+          </a:lnRef>
+          <a:fillRef idx="1">
+            <a:schemeClr val="accent1"/>
+          </a:fillRef>
+          <a:effectRef idx="0">
+            <a:schemeClr val="accent1"/>
+          </a:effectRef>
+          <a:fontRef idx="minor">
+            <a:schemeClr val="lt1"/>
+          </a:fontRef>
+        </p:style>
+        <p:txBody>
+          <a:bodyPr rtlCol="0" anchor="t"/>
+          <a:lstStyle/>
+          <a:p>
+            <a:r>
+              <a:rPr lang="en-US" sz="2000" u="sng" dirty="0">
+                <a:solidFill>
+                  <a:schemeClr val="tx1"/>
+                </a:solidFill>
+              </a:rPr>
+              <a:t>Deadpool</a:t>
+            </a:r>
+          </a:p>
+          <a:p>
+            <a:r>
+              <a:rPr lang="da-DK" sz="1600" dirty="0">
+                <a:solidFill>
+                  <a:schemeClr val="tx1"/>
+                </a:solidFill>
+              </a:rPr>
+              <a:t>Super </a:t>
+            </a:r>
+            <a:r>
+              <a:rPr lang="da-DK" sz="1600" dirty="0" err="1">
+                <a:solidFill>
+                  <a:schemeClr val="tx1"/>
+                </a:solidFill>
+              </a:rPr>
+              <a:t>Skill</a:t>
+            </a:r>
+            <a:r>
+              <a:rPr lang="da-DK" sz="1600" dirty="0">
+                <a:solidFill>
+                  <a:schemeClr val="tx1"/>
+                </a:solidFill>
+              </a:rPr>
+              <a:t> Shot; hold </a:t>
+            </a:r>
+            <a:r>
+              <a:rPr lang="da-DK" sz="1600" dirty="0" err="1">
+                <a:solidFill>
+                  <a:schemeClr val="tx1"/>
+                </a:solidFill>
+              </a:rPr>
+              <a:t>left</a:t>
+            </a:r>
+            <a:r>
+              <a:rPr lang="da-DK" sz="1600" dirty="0">
+                <a:solidFill>
+                  <a:schemeClr val="tx1"/>
+                </a:solidFill>
+              </a:rPr>
+              <a:t> flipper </a:t>
+            </a:r>
+            <a:r>
+              <a:rPr lang="da-DK" sz="1600" dirty="0" err="1">
+                <a:solidFill>
+                  <a:schemeClr val="tx1"/>
+                </a:solidFill>
+              </a:rPr>
+              <a:t>down</a:t>
+            </a:r>
+            <a:r>
+              <a:rPr lang="da-DK" sz="1600" dirty="0">
+                <a:solidFill>
+                  <a:schemeClr val="tx1"/>
+                </a:solidFill>
+              </a:rPr>
+              <a:t>, and </a:t>
+            </a:r>
+            <a:r>
+              <a:rPr lang="da-DK" sz="1600" dirty="0" err="1">
+                <a:solidFill>
+                  <a:schemeClr val="tx1"/>
+                </a:solidFill>
+              </a:rPr>
+              <a:t>lock</a:t>
+            </a:r>
+            <a:r>
+              <a:rPr lang="da-DK" sz="1600" dirty="0">
+                <a:solidFill>
+                  <a:schemeClr val="tx1"/>
+                </a:solidFill>
+              </a:rPr>
+              <a:t> Ninja.</a:t>
+            </a:r>
+          </a:p>
+          <a:p>
+            <a:endParaRPr lang="da-DK" sz="1600" dirty="0">
+              <a:solidFill>
+                <a:schemeClr val="tx1"/>
+              </a:solidFill>
+            </a:endParaRPr>
+          </a:p>
+          <a:p>
+            <a:endParaRPr lang="da-DK" sz="1600" dirty="0">
+              <a:solidFill>
+                <a:schemeClr val="tx1"/>
+              </a:solidFill>
+            </a:endParaRPr>
+          </a:p>
+          <a:p>
+            <a:endParaRPr lang="en-US" sz="1600" dirty="0">
+              <a:solidFill>
+                <a:schemeClr val="tx1"/>
+              </a:solidFill>
+            </a:endParaRPr>
+          </a:p>
+        </p:txBody>
+      </p:sp>
+      <p:sp>
+        <p:nvSpPr>
+          <p:cNvPr id="13" name="Rectangle 24">
+            <a:extLst>
+              <a:ext uri="{FF2B5EF4-FFF2-40B4-BE49-F238E27FC236}">
+                <a16:creationId xmlns:a16="http://schemas.microsoft.com/office/drawing/2014/main" id="{D060D209-54B5-457E-8DA0-D87034B3684D}"/>
+              </a:ext>
+            </a:extLst>
+          </p:cNvPr>
+          <p:cNvSpPr/>
+          <p:nvPr/>
+        </p:nvSpPr>
+        <p:spPr>
+          <a:xfrm rot="16200000">
+            <a:off x="11739747" y="3552221"/>
+            <a:ext cx="567749" cy="336761"/>
+          </a:xfrm>
+          <a:prstGeom prst="rect">
+            <a:avLst/>
+          </a:prstGeom>
+          <a:noFill/>
+          <a:ln>
+            <a:solidFill>
+              <a:schemeClr val="tx1"/>
+            </a:solidFill>
+          </a:ln>
+        </p:spPr>
+        <p:style>
+          <a:lnRef idx="2">
+            <a:schemeClr val="accent1">
+              <a:shade val="50000"/>
+            </a:schemeClr>
+          </a:lnRef>
+          <a:fillRef idx="1">
+            <a:schemeClr val="accent1"/>
+          </a:fillRef>
+          <a:effectRef idx="0">
+            <a:schemeClr val="accent1"/>
+          </a:effectRef>
+          <a:fontRef idx="minor">
+            <a:schemeClr val="lt1"/>
+          </a:fontRef>
+        </p:style>
+        <p:txBody>
+          <a:bodyPr rtlCol="0" anchor="ctr"/>
+          <a:lstStyle/>
+          <a:p>
+            <a:r>
+              <a:rPr lang="da-DK" sz="2400" dirty="0">
+                <a:solidFill>
+                  <a:schemeClr val="tx1"/>
+                </a:solidFill>
+              </a:rPr>
+              <a:t>DP</a:t>
+            </a:r>
+          </a:p>
+        </p:txBody>
+      </p:sp>
+      <p:sp>
+        <p:nvSpPr>
+          <p:cNvPr id="15" name="Rectangle 24">
+            <a:extLst>
+              <a:ext uri="{FF2B5EF4-FFF2-40B4-BE49-F238E27FC236}">
+                <a16:creationId xmlns:a16="http://schemas.microsoft.com/office/drawing/2014/main" id="{E6BA5679-BB02-4BE2-98C7-98AE790BFE31}"/>
+              </a:ext>
+            </a:extLst>
+          </p:cNvPr>
+          <p:cNvSpPr/>
+          <p:nvPr/>
+        </p:nvSpPr>
+        <p:spPr>
+          <a:xfrm rot="16200000">
+            <a:off x="11738025" y="4121881"/>
+            <a:ext cx="567749" cy="343321"/>
+          </a:xfrm>
+          <a:prstGeom prst="rect">
+            <a:avLst/>
+          </a:prstGeom>
+          <a:noFill/>
+          <a:ln>
+            <a:solidFill>
+              <a:schemeClr val="tx1"/>
+            </a:solidFill>
+          </a:ln>
+        </p:spPr>
+        <p:style>
+          <a:lnRef idx="2">
+            <a:schemeClr val="accent1">
+              <a:shade val="50000"/>
+            </a:schemeClr>
+          </a:lnRef>
+          <a:fillRef idx="1">
+            <a:schemeClr val="accent1"/>
+          </a:fillRef>
+          <a:effectRef idx="0">
+            <a:schemeClr val="accent1"/>
+          </a:effectRef>
+          <a:fontRef idx="minor">
+            <a:schemeClr val="lt1"/>
+          </a:fontRef>
+        </p:style>
+        <p:txBody>
+          <a:bodyPr rtlCol="0" anchor="ctr"/>
+          <a:lstStyle/>
+          <a:p>
+            <a:r>
+              <a:rPr lang="da-DK" sz="2400" dirty="0">
+                <a:solidFill>
+                  <a:schemeClr val="tx1"/>
+                </a:solidFill>
+              </a:rPr>
+              <a:t>GB</a:t>
+            </a:r>
+          </a:p>
+        </p:txBody>
+      </p:sp>
     </p:spTree>
     <p:extLst>
       <p:ext uri="{BB962C8B-B14F-4D97-AF65-F5344CB8AC3E}">
-        <p14:creationId xmlns:p14="http://schemas.microsoft.com/office/powerpoint/2010/main" val="643139596"/>
+        <p14:creationId xmlns:p14="http://schemas.microsoft.com/office/powerpoint/2010/main" val="2026078392"/>
       </p:ext>
     </p:extLst>
   </p:cSld>
@@ -9180,10 +11489,705 @@
           <a:chExt cx="0" cy="0"/>
         </a:xfrm>
       </p:grpSpPr>
+      <p:sp>
+        <p:nvSpPr>
+          <p:cNvPr id="46" name="Rectangle 45"/>
+          <p:cNvSpPr/>
+          <p:nvPr/>
+        </p:nvSpPr>
+        <p:spPr>
+          <a:xfrm>
+            <a:off x="6361847" y="0"/>
+            <a:ext cx="5493393" cy="6858000"/>
+          </a:xfrm>
+          <a:prstGeom prst="rect">
+            <a:avLst/>
+          </a:prstGeom>
+          <a:noFill/>
+          <a:ln>
+            <a:noFill/>
+          </a:ln>
+        </p:spPr>
+        <p:style>
+          <a:lnRef idx="2">
+            <a:schemeClr val="accent1">
+              <a:shade val="50000"/>
+            </a:schemeClr>
+          </a:lnRef>
+          <a:fillRef idx="1">
+            <a:schemeClr val="accent1"/>
+          </a:fillRef>
+          <a:effectRef idx="0">
+            <a:schemeClr val="accent1"/>
+          </a:effectRef>
+          <a:fontRef idx="minor">
+            <a:schemeClr val="lt1"/>
+          </a:fontRef>
+        </p:style>
+        <p:txBody>
+          <a:bodyPr rtlCol="0" anchor="t"/>
+          <a:lstStyle/>
+          <a:p>
+            <a:r>
+              <a:rPr lang="en-US" sz="1600" u="sng" dirty="0">
+                <a:solidFill>
+                  <a:schemeClr val="tx1"/>
+                </a:solidFill>
+              </a:rPr>
+              <a:t>Black knight: Sword of rage</a:t>
+            </a:r>
+          </a:p>
+          <a:p>
+            <a:r>
+              <a:rPr lang="en-US" sz="1400" dirty="0">
+                <a:solidFill>
+                  <a:srgbClr val="1D2228"/>
+                </a:solidFill>
+              </a:rPr>
+              <a:t>Left flipper Super Skill Shot - hit one of the 3 Knight shots (flail (spinning thing), Knight target or Shield) otherwise hit 3 Knights shots x timer, before, hit the center ramp and then the shield (raised) into the scoop to begin a mode, Spinner change modes.</a:t>
+            </a:r>
+          </a:p>
+          <a:p>
+            <a:r>
+              <a:rPr lang="en-US" sz="1400" dirty="0">
+                <a:solidFill>
+                  <a:srgbClr val="1D2228"/>
+                </a:solidFill>
+              </a:rPr>
+              <a:t> </a:t>
+            </a:r>
+          </a:p>
+          <a:p>
+            <a:endParaRPr lang="en-US" sz="1600" dirty="0">
+              <a:solidFill>
+                <a:schemeClr val="tx1"/>
+              </a:solidFill>
+            </a:endParaRPr>
+          </a:p>
+          <a:p>
+            <a:endParaRPr lang="da-DK" sz="1600" dirty="0">
+              <a:solidFill>
+                <a:schemeClr val="tx1"/>
+              </a:solidFill>
+            </a:endParaRPr>
+          </a:p>
+        </p:txBody>
+      </p:sp>
+      <p:cxnSp>
+        <p:nvCxnSpPr>
+          <p:cNvPr id="3" name="Lige forbindelse 2">
+            <a:extLst>
+              <a:ext uri="{FF2B5EF4-FFF2-40B4-BE49-F238E27FC236}">
+                <a16:creationId xmlns:a16="http://schemas.microsoft.com/office/drawing/2014/main" id="{EC4D2C1E-30AB-4E50-A40F-877A9D7DE9C3}"/>
+              </a:ext>
+            </a:extLst>
+          </p:cNvPr>
+          <p:cNvCxnSpPr>
+            <a:cxnSpLocks/>
+          </p:cNvCxnSpPr>
+          <p:nvPr/>
+        </p:nvCxnSpPr>
+        <p:spPr>
+          <a:xfrm>
+            <a:off x="6122190" y="0"/>
+            <a:ext cx="0" cy="6858000"/>
+          </a:xfrm>
+          <a:prstGeom prst="line">
+            <a:avLst/>
+          </a:prstGeom>
+          <a:noFill/>
+          <a:ln>
+            <a:solidFill>
+              <a:schemeClr val="tx1"/>
+            </a:solidFill>
+            <a:prstDash val="dash"/>
+          </a:ln>
+        </p:spPr>
+        <p:style>
+          <a:lnRef idx="2">
+            <a:schemeClr val="accent1">
+              <a:shade val="50000"/>
+            </a:schemeClr>
+          </a:lnRef>
+          <a:fillRef idx="1">
+            <a:schemeClr val="accent1"/>
+          </a:fillRef>
+          <a:effectRef idx="0">
+            <a:schemeClr val="accent1"/>
+          </a:effectRef>
+          <a:fontRef idx="minor">
+            <a:schemeClr val="lt1"/>
+          </a:fontRef>
+        </p:style>
+      </p:cxnSp>
+      <p:sp>
+        <p:nvSpPr>
+          <p:cNvPr id="22" name="Rectangle 45">
+            <a:extLst>
+              <a:ext uri="{FF2B5EF4-FFF2-40B4-BE49-F238E27FC236}">
+                <a16:creationId xmlns:a16="http://schemas.microsoft.com/office/drawing/2014/main" id="{35966423-ABBF-430C-AFF2-7B909C7ED229}"/>
+              </a:ext>
+            </a:extLst>
+          </p:cNvPr>
+          <p:cNvSpPr/>
+          <p:nvPr/>
+        </p:nvSpPr>
+        <p:spPr>
+          <a:xfrm>
+            <a:off x="389140" y="0"/>
+            <a:ext cx="5581938" cy="6858000"/>
+          </a:xfrm>
+          <a:prstGeom prst="rect">
+            <a:avLst/>
+          </a:prstGeom>
+          <a:noFill/>
+          <a:ln>
+            <a:noFill/>
+          </a:ln>
+        </p:spPr>
+        <p:style>
+          <a:lnRef idx="2">
+            <a:schemeClr val="accent1">
+              <a:shade val="50000"/>
+            </a:schemeClr>
+          </a:lnRef>
+          <a:fillRef idx="1">
+            <a:schemeClr val="accent1"/>
+          </a:fillRef>
+          <a:effectRef idx="0">
+            <a:schemeClr val="accent1"/>
+          </a:effectRef>
+          <a:fontRef idx="minor">
+            <a:schemeClr val="lt1"/>
+          </a:fontRef>
+        </p:style>
+        <p:txBody>
+          <a:bodyPr rtlCol="0" anchor="t"/>
+          <a:lstStyle/>
+          <a:p>
+            <a:endParaRPr lang="da-DK" sz="2000" dirty="0">
+              <a:solidFill>
+                <a:schemeClr val="tx1"/>
+              </a:solidFill>
+            </a:endParaRPr>
+          </a:p>
+        </p:txBody>
+      </p:sp>
+      <p:cxnSp>
+        <p:nvCxnSpPr>
+          <p:cNvPr id="34" name="Lige forbindelse 33">
+            <a:extLst>
+              <a:ext uri="{FF2B5EF4-FFF2-40B4-BE49-F238E27FC236}">
+                <a16:creationId xmlns:a16="http://schemas.microsoft.com/office/drawing/2014/main" id="{8D81A370-147D-4985-A3D9-B95DCDF1235B}"/>
+              </a:ext>
+            </a:extLst>
+          </p:cNvPr>
+          <p:cNvCxnSpPr>
+            <a:cxnSpLocks/>
+          </p:cNvCxnSpPr>
+          <p:nvPr/>
+        </p:nvCxnSpPr>
+        <p:spPr>
+          <a:xfrm>
+            <a:off x="11855241" y="-17585"/>
+            <a:ext cx="0" cy="6858000"/>
+          </a:xfrm>
+          <a:prstGeom prst="line">
+            <a:avLst/>
+          </a:prstGeom>
+          <a:noFill/>
+          <a:ln>
+            <a:solidFill>
+              <a:schemeClr val="tx1"/>
+            </a:solidFill>
+            <a:prstDash val="dash"/>
+          </a:ln>
+        </p:spPr>
+        <p:style>
+          <a:lnRef idx="2">
+            <a:schemeClr val="accent1">
+              <a:shade val="50000"/>
+            </a:schemeClr>
+          </a:lnRef>
+          <a:fillRef idx="1">
+            <a:schemeClr val="accent1"/>
+          </a:fillRef>
+          <a:effectRef idx="0">
+            <a:schemeClr val="accent1"/>
+          </a:effectRef>
+          <a:fontRef idx="minor">
+            <a:schemeClr val="lt1"/>
+          </a:fontRef>
+        </p:style>
+      </p:cxnSp>
+      <p:cxnSp>
+        <p:nvCxnSpPr>
+          <p:cNvPr id="36" name="Lige forbindelse 35">
+            <a:extLst>
+              <a:ext uri="{FF2B5EF4-FFF2-40B4-BE49-F238E27FC236}">
+                <a16:creationId xmlns:a16="http://schemas.microsoft.com/office/drawing/2014/main" id="{C389E322-3657-4847-ABCA-8467052ED383}"/>
+              </a:ext>
+            </a:extLst>
+          </p:cNvPr>
+          <p:cNvCxnSpPr>
+            <a:cxnSpLocks/>
+          </p:cNvCxnSpPr>
+          <p:nvPr/>
+        </p:nvCxnSpPr>
+        <p:spPr>
+          <a:xfrm>
+            <a:off x="62523" y="0"/>
+            <a:ext cx="11973581" cy="0"/>
+          </a:xfrm>
+          <a:prstGeom prst="line">
+            <a:avLst/>
+          </a:prstGeom>
+          <a:noFill/>
+          <a:ln>
+            <a:solidFill>
+              <a:schemeClr val="tx1"/>
+            </a:solidFill>
+            <a:prstDash val="dash"/>
+          </a:ln>
+        </p:spPr>
+        <p:style>
+          <a:lnRef idx="2">
+            <a:schemeClr val="accent1">
+              <a:shade val="50000"/>
+            </a:schemeClr>
+          </a:lnRef>
+          <a:fillRef idx="1">
+            <a:schemeClr val="accent1"/>
+          </a:fillRef>
+          <a:effectRef idx="0">
+            <a:schemeClr val="accent1"/>
+          </a:effectRef>
+          <a:fontRef idx="minor">
+            <a:schemeClr val="lt1"/>
+          </a:fontRef>
+        </p:style>
+      </p:cxnSp>
+      <p:cxnSp>
+        <p:nvCxnSpPr>
+          <p:cNvPr id="38" name="Lige forbindelse 37">
+            <a:extLst>
+              <a:ext uri="{FF2B5EF4-FFF2-40B4-BE49-F238E27FC236}">
+                <a16:creationId xmlns:a16="http://schemas.microsoft.com/office/drawing/2014/main" id="{188BE1E8-393B-41EA-9211-7A8793F72BFB}"/>
+              </a:ext>
+            </a:extLst>
+          </p:cNvPr>
+          <p:cNvCxnSpPr>
+            <a:cxnSpLocks/>
+          </p:cNvCxnSpPr>
+          <p:nvPr/>
+        </p:nvCxnSpPr>
+        <p:spPr>
+          <a:xfrm>
+            <a:off x="50821" y="6856535"/>
+            <a:ext cx="12142739" cy="1465"/>
+          </a:xfrm>
+          <a:prstGeom prst="line">
+            <a:avLst/>
+          </a:prstGeom>
+          <a:noFill/>
+          <a:ln>
+            <a:solidFill>
+              <a:schemeClr val="tx1"/>
+            </a:solidFill>
+            <a:prstDash val="dash"/>
+          </a:ln>
+        </p:spPr>
+        <p:style>
+          <a:lnRef idx="2">
+            <a:schemeClr val="accent1">
+              <a:shade val="50000"/>
+            </a:schemeClr>
+          </a:lnRef>
+          <a:fillRef idx="1">
+            <a:schemeClr val="accent1"/>
+          </a:fillRef>
+          <a:effectRef idx="0">
+            <a:schemeClr val="accent1"/>
+          </a:effectRef>
+          <a:fontRef idx="minor">
+            <a:schemeClr val="lt1"/>
+          </a:fontRef>
+        </p:style>
+      </p:cxnSp>
+      <p:sp>
+        <p:nvSpPr>
+          <p:cNvPr id="14" name="Rectangle 45">
+            <a:extLst>
+              <a:ext uri="{FF2B5EF4-FFF2-40B4-BE49-F238E27FC236}">
+                <a16:creationId xmlns:a16="http://schemas.microsoft.com/office/drawing/2014/main" id="{7A0187B6-5002-4A4A-A1AF-0008BF9B9AB2}"/>
+              </a:ext>
+            </a:extLst>
+          </p:cNvPr>
+          <p:cNvSpPr/>
+          <p:nvPr/>
+        </p:nvSpPr>
+        <p:spPr>
+          <a:xfrm>
+            <a:off x="453293" y="-1465"/>
+            <a:ext cx="5521692" cy="6858000"/>
+          </a:xfrm>
+          <a:prstGeom prst="rect">
+            <a:avLst/>
+          </a:prstGeom>
+          <a:noFill/>
+          <a:ln>
+            <a:noFill/>
+          </a:ln>
+        </p:spPr>
+        <p:style>
+          <a:lnRef idx="2">
+            <a:schemeClr val="accent1">
+              <a:shade val="50000"/>
+            </a:schemeClr>
+          </a:lnRef>
+          <a:fillRef idx="1">
+            <a:schemeClr val="accent1"/>
+          </a:fillRef>
+          <a:effectRef idx="0">
+            <a:schemeClr val="accent1"/>
+          </a:effectRef>
+          <a:fontRef idx="minor">
+            <a:schemeClr val="lt1"/>
+          </a:fontRef>
+        </p:style>
+        <p:txBody>
+          <a:bodyPr rtlCol="0" anchor="t"/>
+          <a:lstStyle/>
+          <a:p>
+            <a:r>
+              <a:rPr lang="da-DK" sz="2000" u="sng" dirty="0" err="1">
+                <a:solidFill>
+                  <a:schemeClr val="tx1"/>
+                </a:solidFill>
+              </a:rPr>
+              <a:t>Creature</a:t>
+            </a:r>
+            <a:r>
+              <a:rPr lang="da-DK" sz="2000" u="sng" dirty="0">
+                <a:solidFill>
+                  <a:schemeClr val="tx1"/>
+                </a:solidFill>
+              </a:rPr>
+              <a:t> from the </a:t>
+            </a:r>
+            <a:r>
+              <a:rPr lang="da-DK" sz="2000" u="sng" dirty="0" err="1">
+                <a:solidFill>
+                  <a:schemeClr val="tx1"/>
+                </a:solidFill>
+              </a:rPr>
+              <a:t>black</a:t>
+            </a:r>
+            <a:r>
+              <a:rPr lang="da-DK" sz="2000" u="sng" dirty="0">
+                <a:solidFill>
+                  <a:schemeClr val="tx1"/>
+                </a:solidFill>
+              </a:rPr>
+              <a:t> </a:t>
+            </a:r>
+            <a:r>
+              <a:rPr lang="da-DK" sz="2000" u="sng" dirty="0" err="1">
+                <a:solidFill>
+                  <a:schemeClr val="tx1"/>
+                </a:solidFill>
+              </a:rPr>
+              <a:t>lagon</a:t>
+            </a:r>
+            <a:endParaRPr lang="en-US" sz="2000" u="sng" dirty="0">
+              <a:solidFill>
+                <a:schemeClr val="tx1"/>
+              </a:solidFill>
+            </a:endParaRPr>
+          </a:p>
+          <a:p>
+            <a:r>
+              <a:rPr lang="da-DK" sz="1600" dirty="0" err="1">
+                <a:solidFill>
+                  <a:schemeClr val="tx1"/>
+                </a:solidFill>
+              </a:rPr>
+              <a:t>Skillshot</a:t>
+            </a:r>
+            <a:r>
+              <a:rPr lang="da-DK" sz="1600" dirty="0">
+                <a:solidFill>
+                  <a:schemeClr val="tx1"/>
+                </a:solidFill>
+              </a:rPr>
+              <a:t>: go for 4-kisses, </a:t>
+            </a:r>
+            <a:r>
+              <a:rPr lang="da-DK" sz="1600" dirty="0" err="1">
+                <a:solidFill>
+                  <a:schemeClr val="tx1"/>
+                </a:solidFill>
+              </a:rPr>
+              <a:t>plung</a:t>
+            </a:r>
+            <a:r>
+              <a:rPr lang="da-DK" sz="1600" dirty="0">
+                <a:solidFill>
+                  <a:schemeClr val="tx1"/>
+                </a:solidFill>
+              </a:rPr>
+              <a:t> </a:t>
+            </a:r>
+            <a:r>
+              <a:rPr lang="da-DK" sz="1600" dirty="0" err="1">
+                <a:solidFill>
+                  <a:schemeClr val="tx1"/>
+                </a:solidFill>
+              </a:rPr>
+              <a:t>when</a:t>
+            </a:r>
+            <a:r>
+              <a:rPr lang="da-DK" sz="1600" dirty="0">
+                <a:solidFill>
+                  <a:schemeClr val="tx1"/>
+                </a:solidFill>
+              </a:rPr>
+              <a:t> </a:t>
+            </a:r>
+            <a:r>
+              <a:rPr lang="da-DK" sz="1600" dirty="0" err="1">
+                <a:solidFill>
+                  <a:schemeClr val="tx1"/>
+                </a:solidFill>
+              </a:rPr>
+              <a:t>only</a:t>
+            </a:r>
+            <a:r>
+              <a:rPr lang="da-DK" sz="1600" dirty="0">
+                <a:solidFill>
+                  <a:schemeClr val="tx1"/>
+                </a:solidFill>
+              </a:rPr>
+              <a:t> k is </a:t>
+            </a:r>
+            <a:r>
+              <a:rPr lang="da-DK" sz="1600" dirty="0" err="1">
+                <a:solidFill>
+                  <a:schemeClr val="tx1"/>
+                </a:solidFill>
+              </a:rPr>
+              <a:t>lite</a:t>
+            </a:r>
+            <a:r>
+              <a:rPr lang="da-DK" sz="1600" dirty="0">
+                <a:solidFill>
+                  <a:schemeClr val="tx1"/>
+                </a:solidFill>
+              </a:rPr>
+              <a:t>.</a:t>
+            </a:r>
+          </a:p>
+          <a:p>
+            <a:endParaRPr lang="da-DK" sz="1600" dirty="0">
+              <a:solidFill>
+                <a:schemeClr val="tx1"/>
+              </a:solidFill>
+            </a:endParaRPr>
+          </a:p>
+          <a:p>
+            <a:r>
+              <a:rPr lang="da-DK" sz="1600" dirty="0">
+                <a:solidFill>
+                  <a:schemeClr val="tx1"/>
+                </a:solidFill>
+              </a:rPr>
+              <a:t>Any mode running </a:t>
+            </a:r>
+            <a:r>
+              <a:rPr lang="da-DK" sz="1600" dirty="0" err="1">
+                <a:solidFill>
+                  <a:schemeClr val="tx1"/>
+                </a:solidFill>
+              </a:rPr>
+              <a:t>will</a:t>
+            </a:r>
+            <a:r>
+              <a:rPr lang="da-DK" sz="1600" dirty="0">
+                <a:solidFill>
+                  <a:schemeClr val="tx1"/>
+                </a:solidFill>
+              </a:rPr>
+              <a:t> re-start </a:t>
+            </a:r>
+            <a:r>
+              <a:rPr lang="da-DK" sz="1600" dirty="0" err="1">
+                <a:solidFill>
+                  <a:schemeClr val="tx1"/>
+                </a:solidFill>
+              </a:rPr>
+              <a:t>after</a:t>
+            </a:r>
+            <a:r>
+              <a:rPr lang="da-DK" sz="1600" dirty="0">
+                <a:solidFill>
+                  <a:schemeClr val="tx1"/>
+                </a:solidFill>
+              </a:rPr>
+              <a:t> </a:t>
+            </a:r>
+            <a:r>
+              <a:rPr lang="da-DK" sz="1600" dirty="0" err="1">
+                <a:solidFill>
+                  <a:schemeClr val="tx1"/>
+                </a:solidFill>
+              </a:rPr>
+              <a:t>multiball</a:t>
+            </a:r>
+            <a:r>
+              <a:rPr lang="da-DK" sz="1600" dirty="0">
+                <a:solidFill>
+                  <a:schemeClr val="tx1"/>
+                </a:solidFill>
+              </a:rPr>
+              <a:t>!</a:t>
+            </a:r>
+          </a:p>
+          <a:p>
+            <a:endParaRPr lang="da-DK" sz="1600" dirty="0">
+              <a:solidFill>
+                <a:schemeClr val="tx1"/>
+              </a:solidFill>
+            </a:endParaRPr>
+          </a:p>
+          <a:p>
+            <a:endParaRPr lang="en-US" sz="1600" dirty="0">
+              <a:solidFill>
+                <a:schemeClr val="tx1"/>
+              </a:solidFill>
+            </a:endParaRPr>
+          </a:p>
+        </p:txBody>
+      </p:sp>
+      <p:sp>
+        <p:nvSpPr>
+          <p:cNvPr id="19" name="Rectangle 24">
+            <a:extLst>
+              <a:ext uri="{FF2B5EF4-FFF2-40B4-BE49-F238E27FC236}">
+                <a16:creationId xmlns:a16="http://schemas.microsoft.com/office/drawing/2014/main" id="{FE5C89C5-818F-4B69-B331-46B04878259E}"/>
+              </a:ext>
+            </a:extLst>
+          </p:cNvPr>
+          <p:cNvSpPr/>
+          <p:nvPr/>
+        </p:nvSpPr>
+        <p:spPr>
+          <a:xfrm rot="16200000">
+            <a:off x="11543742" y="4888927"/>
+            <a:ext cx="960251" cy="336266"/>
+          </a:xfrm>
+          <a:prstGeom prst="rect">
+            <a:avLst/>
+          </a:prstGeom>
+          <a:noFill/>
+          <a:ln>
+            <a:solidFill>
+              <a:schemeClr val="tx1"/>
+            </a:solidFill>
+          </a:ln>
+        </p:spPr>
+        <p:style>
+          <a:lnRef idx="2">
+            <a:schemeClr val="accent1">
+              <a:shade val="50000"/>
+            </a:schemeClr>
+          </a:lnRef>
+          <a:fillRef idx="1">
+            <a:schemeClr val="accent1"/>
+          </a:fillRef>
+          <a:effectRef idx="0">
+            <a:schemeClr val="accent1"/>
+          </a:effectRef>
+          <a:fontRef idx="minor">
+            <a:schemeClr val="lt1"/>
+          </a:fontRef>
+        </p:style>
+        <p:txBody>
+          <a:bodyPr rtlCol="0" anchor="ctr"/>
+          <a:lstStyle/>
+          <a:p>
+            <a:r>
+              <a:rPr lang="da-DK" sz="2400" dirty="0">
+                <a:solidFill>
+                  <a:schemeClr val="tx1"/>
+                </a:solidFill>
+              </a:rPr>
+              <a:t>CFTBL</a:t>
+            </a:r>
+          </a:p>
+        </p:txBody>
+      </p:sp>
+      <p:sp>
+        <p:nvSpPr>
+          <p:cNvPr id="20" name="Rectangle 24">
+            <a:extLst>
+              <a:ext uri="{FF2B5EF4-FFF2-40B4-BE49-F238E27FC236}">
+                <a16:creationId xmlns:a16="http://schemas.microsoft.com/office/drawing/2014/main" id="{9BE6E3CA-A5F1-4F89-A43F-4E4B5C0D38C9}"/>
+              </a:ext>
+            </a:extLst>
+          </p:cNvPr>
+          <p:cNvSpPr/>
+          <p:nvPr/>
+        </p:nvSpPr>
+        <p:spPr>
+          <a:xfrm rot="16200000">
+            <a:off x="11504194" y="5886922"/>
+            <a:ext cx="1035738" cy="336266"/>
+          </a:xfrm>
+          <a:prstGeom prst="rect">
+            <a:avLst/>
+          </a:prstGeom>
+          <a:noFill/>
+          <a:ln>
+            <a:solidFill>
+              <a:schemeClr val="tx1"/>
+            </a:solidFill>
+          </a:ln>
+        </p:spPr>
+        <p:style>
+          <a:lnRef idx="2">
+            <a:schemeClr val="accent1">
+              <a:shade val="50000"/>
+            </a:schemeClr>
+          </a:lnRef>
+          <a:fillRef idx="1">
+            <a:schemeClr val="accent1"/>
+          </a:fillRef>
+          <a:effectRef idx="0">
+            <a:schemeClr val="accent1"/>
+          </a:effectRef>
+          <a:fontRef idx="minor">
+            <a:schemeClr val="lt1"/>
+          </a:fontRef>
+        </p:style>
+        <p:txBody>
+          <a:bodyPr rtlCol="0" anchor="ctr"/>
+          <a:lstStyle/>
+          <a:p>
+            <a:r>
+              <a:rPr lang="da-DK" sz="2400" dirty="0">
+                <a:solidFill>
+                  <a:schemeClr val="tx1"/>
+                </a:solidFill>
+              </a:rPr>
+              <a:t>BKSOR</a:t>
+            </a:r>
+          </a:p>
+        </p:txBody>
+      </p:sp>
     </p:spTree>
     <p:extLst>
       <p:ext uri="{BB962C8B-B14F-4D97-AF65-F5344CB8AC3E}">
-        <p14:creationId xmlns:p14="http://schemas.microsoft.com/office/powerpoint/2010/main" val="2935249242"/>
+        <p14:creationId xmlns:p14="http://schemas.microsoft.com/office/powerpoint/2010/main" val="3461913757"/>
       </p:ext>
     </p:extLst>
   </p:cSld>

</xml_diff>